<commit_message>
adjusted code to ensure recompiling after upstream changes
</commit_message>
<xml_diff>
--- a/src/test/resources/org/xmlcml/norma/demos/cert/varga/math7links.pptx
+++ b/src/test/resources/org/xmlcml/norma/demos/cert/varga/math7links.pptx
@@ -5,7 +5,13 @@
     <p:sldMasterId id="2147483648" r:id="rId1"/>
   </p:sldMasterIdLst>
   <p:sldIdLst>
-    <p:sldId id="256" r:id="rId2"/>
+    <p:sldId id="260" r:id="rId2"/>
+    <p:sldId id="259" r:id="rId3"/>
+    <p:sldId id="261" r:id="rId4"/>
+    <p:sldId id="263" r:id="rId5"/>
+    <p:sldId id="262" r:id="rId6"/>
+    <p:sldId id="256" r:id="rId7"/>
+    <p:sldId id="258" r:id="rId8"/>
   </p:sldIdLst>
   <p:sldSz cx="9144000" cy="6858000" type="screen4x3"/>
   <p:notesSz cx="6858000" cy="9144000"/>
@@ -288,7 +294,7 @@
           <a:p>
             <a:fld id="{2C6472F1-65FD-204C-A27D-A96ACCC3B0AE}" type="datetimeFigureOut">
               <a:rPr lang="en-US" smtClean="0"/>
-              <a:t>21/02/2018</a:t>
+              <a:t>22/02/2018</a:t>
             </a:fld>
             <a:endParaRPr lang="en-US"/>
           </a:p>
@@ -346,6 +352,14 @@
   <p:clrMapOvr>
     <a:masterClrMapping/>
   </p:clrMapOvr>
+  <mc:AlternateContent xmlns:mc="http://schemas.openxmlformats.org/markup-compatibility/2006">
+    <mc:Choice xmlns:p14="http://schemas.microsoft.com/office/powerpoint/2010/main" Requires="p14">
+      <p:transition spd="slow" p14:dur="2000" advTm="5000"/>
+    </mc:Choice>
+    <mc:Fallback>
+      <p:transition xmlns:p14="http://schemas.microsoft.com/office/powerpoint/2010/main" spd="slow" advTm="5000"/>
+    </mc:Fallback>
+  </mc:AlternateContent>
 </p:sldLayout>
 </file>
 
@@ -458,7 +472,7 @@
           <a:p>
             <a:fld id="{2C6472F1-65FD-204C-A27D-A96ACCC3B0AE}" type="datetimeFigureOut">
               <a:rPr lang="en-US" smtClean="0"/>
-              <a:t>21/02/2018</a:t>
+              <a:t>22/02/2018</a:t>
             </a:fld>
             <a:endParaRPr lang="en-US"/>
           </a:p>
@@ -516,6 +530,14 @@
   <p:clrMapOvr>
     <a:masterClrMapping/>
   </p:clrMapOvr>
+  <mc:AlternateContent xmlns:mc="http://schemas.openxmlformats.org/markup-compatibility/2006">
+    <mc:Choice xmlns:p14="http://schemas.microsoft.com/office/powerpoint/2010/main" Requires="p14">
+      <p:transition spd="slow" p14:dur="2000" advTm="5000"/>
+    </mc:Choice>
+    <mc:Fallback>
+      <p:transition xmlns:p14="http://schemas.microsoft.com/office/powerpoint/2010/main" spd="slow" advTm="5000"/>
+    </mc:Fallback>
+  </mc:AlternateContent>
 </p:sldLayout>
 </file>
 
@@ -638,7 +660,7 @@
           <a:p>
             <a:fld id="{2C6472F1-65FD-204C-A27D-A96ACCC3B0AE}" type="datetimeFigureOut">
               <a:rPr lang="en-US" smtClean="0"/>
-              <a:t>21/02/2018</a:t>
+              <a:t>22/02/2018</a:t>
             </a:fld>
             <a:endParaRPr lang="en-US"/>
           </a:p>
@@ -696,6 +718,14 @@
   <p:clrMapOvr>
     <a:masterClrMapping/>
   </p:clrMapOvr>
+  <mc:AlternateContent xmlns:mc="http://schemas.openxmlformats.org/markup-compatibility/2006">
+    <mc:Choice xmlns:p14="http://schemas.microsoft.com/office/powerpoint/2010/main" Requires="p14">
+      <p:transition spd="slow" p14:dur="2000" advTm="5000"/>
+    </mc:Choice>
+    <mc:Fallback>
+      <p:transition xmlns:p14="http://schemas.microsoft.com/office/powerpoint/2010/main" spd="slow" advTm="5000"/>
+    </mc:Fallback>
+  </mc:AlternateContent>
 </p:sldLayout>
 </file>
 
@@ -808,7 +838,7 @@
           <a:p>
             <a:fld id="{2C6472F1-65FD-204C-A27D-A96ACCC3B0AE}" type="datetimeFigureOut">
               <a:rPr lang="en-US" smtClean="0"/>
-              <a:t>21/02/2018</a:t>
+              <a:t>22/02/2018</a:t>
             </a:fld>
             <a:endParaRPr lang="en-US"/>
           </a:p>
@@ -866,6 +896,14 @@
   <p:clrMapOvr>
     <a:masterClrMapping/>
   </p:clrMapOvr>
+  <mc:AlternateContent xmlns:mc="http://schemas.openxmlformats.org/markup-compatibility/2006">
+    <mc:Choice xmlns:p14="http://schemas.microsoft.com/office/powerpoint/2010/main" Requires="p14">
+      <p:transition spd="slow" p14:dur="2000" advTm="5000"/>
+    </mc:Choice>
+    <mc:Fallback>
+      <p:transition xmlns:p14="http://schemas.microsoft.com/office/powerpoint/2010/main" spd="slow" advTm="5000"/>
+    </mc:Fallback>
+  </mc:AlternateContent>
 </p:sldLayout>
 </file>
 
@@ -1054,7 +1092,7 @@
           <a:p>
             <a:fld id="{2C6472F1-65FD-204C-A27D-A96ACCC3B0AE}" type="datetimeFigureOut">
               <a:rPr lang="en-US" smtClean="0"/>
-              <a:t>21/02/2018</a:t>
+              <a:t>22/02/2018</a:t>
             </a:fld>
             <a:endParaRPr lang="en-US"/>
           </a:p>
@@ -1112,6 +1150,14 @@
   <p:clrMapOvr>
     <a:masterClrMapping/>
   </p:clrMapOvr>
+  <mc:AlternateContent xmlns:mc="http://schemas.openxmlformats.org/markup-compatibility/2006">
+    <mc:Choice xmlns:p14="http://schemas.microsoft.com/office/powerpoint/2010/main" Requires="p14">
+      <p:transition spd="slow" p14:dur="2000" advTm="5000"/>
+    </mc:Choice>
+    <mc:Fallback>
+      <p:transition xmlns:p14="http://schemas.microsoft.com/office/powerpoint/2010/main" spd="slow" advTm="5000"/>
+    </mc:Fallback>
+  </mc:AlternateContent>
 </p:sldLayout>
 </file>
 
@@ -1342,7 +1388,7 @@
           <a:p>
             <a:fld id="{2C6472F1-65FD-204C-A27D-A96ACCC3B0AE}" type="datetimeFigureOut">
               <a:rPr lang="en-US" smtClean="0"/>
-              <a:t>21/02/2018</a:t>
+              <a:t>22/02/2018</a:t>
             </a:fld>
             <a:endParaRPr lang="en-US"/>
           </a:p>
@@ -1400,6 +1446,14 @@
   <p:clrMapOvr>
     <a:masterClrMapping/>
   </p:clrMapOvr>
+  <mc:AlternateContent xmlns:mc="http://schemas.openxmlformats.org/markup-compatibility/2006">
+    <mc:Choice xmlns:p14="http://schemas.microsoft.com/office/powerpoint/2010/main" Requires="p14">
+      <p:transition spd="slow" p14:dur="2000" advTm="5000"/>
+    </mc:Choice>
+    <mc:Fallback>
+      <p:transition xmlns:p14="http://schemas.microsoft.com/office/powerpoint/2010/main" spd="slow" advTm="5000"/>
+    </mc:Fallback>
+  </mc:AlternateContent>
 </p:sldLayout>
 </file>
 
@@ -1764,7 +1818,7 @@
           <a:p>
             <a:fld id="{2C6472F1-65FD-204C-A27D-A96ACCC3B0AE}" type="datetimeFigureOut">
               <a:rPr lang="en-US" smtClean="0"/>
-              <a:t>21/02/2018</a:t>
+              <a:t>22/02/2018</a:t>
             </a:fld>
             <a:endParaRPr lang="en-US"/>
           </a:p>
@@ -1822,6 +1876,14 @@
   <p:clrMapOvr>
     <a:masterClrMapping/>
   </p:clrMapOvr>
+  <mc:AlternateContent xmlns:mc="http://schemas.openxmlformats.org/markup-compatibility/2006">
+    <mc:Choice xmlns:p14="http://schemas.microsoft.com/office/powerpoint/2010/main" Requires="p14">
+      <p:transition spd="slow" p14:dur="2000" advTm="5000"/>
+    </mc:Choice>
+    <mc:Fallback>
+      <p:transition xmlns:p14="http://schemas.microsoft.com/office/powerpoint/2010/main" spd="slow" advTm="5000"/>
+    </mc:Fallback>
+  </mc:AlternateContent>
 </p:sldLayout>
 </file>
 
@@ -1882,7 +1944,7 @@
           <a:p>
             <a:fld id="{2C6472F1-65FD-204C-A27D-A96ACCC3B0AE}" type="datetimeFigureOut">
               <a:rPr lang="en-US" smtClean="0"/>
-              <a:t>21/02/2018</a:t>
+              <a:t>22/02/2018</a:t>
             </a:fld>
             <a:endParaRPr lang="en-US"/>
           </a:p>
@@ -1940,6 +2002,14 @@
   <p:clrMapOvr>
     <a:masterClrMapping/>
   </p:clrMapOvr>
+  <mc:AlternateContent xmlns:mc="http://schemas.openxmlformats.org/markup-compatibility/2006">
+    <mc:Choice xmlns:p14="http://schemas.microsoft.com/office/powerpoint/2010/main" Requires="p14">
+      <p:transition spd="slow" p14:dur="2000" advTm="5000"/>
+    </mc:Choice>
+    <mc:Fallback>
+      <p:transition xmlns:p14="http://schemas.microsoft.com/office/powerpoint/2010/main" spd="slow" advTm="5000"/>
+    </mc:Fallback>
+  </mc:AlternateContent>
 </p:sldLayout>
 </file>
 
@@ -1977,7 +2047,7 @@
           <a:p>
             <a:fld id="{2C6472F1-65FD-204C-A27D-A96ACCC3B0AE}" type="datetimeFigureOut">
               <a:rPr lang="en-US" smtClean="0"/>
-              <a:t>21/02/2018</a:t>
+              <a:t>22/02/2018</a:t>
             </a:fld>
             <a:endParaRPr lang="en-US"/>
           </a:p>
@@ -2035,6 +2105,14 @@
   <p:clrMapOvr>
     <a:masterClrMapping/>
   </p:clrMapOvr>
+  <mc:AlternateContent xmlns:mc="http://schemas.openxmlformats.org/markup-compatibility/2006">
+    <mc:Choice xmlns:p14="http://schemas.microsoft.com/office/powerpoint/2010/main" Requires="p14">
+      <p:transition spd="slow" p14:dur="2000" advTm="5000"/>
+    </mc:Choice>
+    <mc:Fallback>
+      <p:transition xmlns:p14="http://schemas.microsoft.com/office/powerpoint/2010/main" spd="slow" advTm="5000"/>
+    </mc:Fallback>
+  </mc:AlternateContent>
 </p:sldLayout>
 </file>
 
@@ -2254,7 +2332,7 @@
           <a:p>
             <a:fld id="{2C6472F1-65FD-204C-A27D-A96ACCC3B0AE}" type="datetimeFigureOut">
               <a:rPr lang="en-US" smtClean="0"/>
-              <a:t>21/02/2018</a:t>
+              <a:t>22/02/2018</a:t>
             </a:fld>
             <a:endParaRPr lang="en-US"/>
           </a:p>
@@ -2312,6 +2390,14 @@
   <p:clrMapOvr>
     <a:masterClrMapping/>
   </p:clrMapOvr>
+  <mc:AlternateContent xmlns:mc="http://schemas.openxmlformats.org/markup-compatibility/2006">
+    <mc:Choice xmlns:p14="http://schemas.microsoft.com/office/powerpoint/2010/main" Requires="p14">
+      <p:transition spd="slow" p14:dur="2000" advTm="5000"/>
+    </mc:Choice>
+    <mc:Fallback>
+      <p:transition xmlns:p14="http://schemas.microsoft.com/office/powerpoint/2010/main" spd="slow" advTm="5000"/>
+    </mc:Fallback>
+  </mc:AlternateContent>
 </p:sldLayout>
 </file>
 
@@ -2507,7 +2593,7 @@
           <a:p>
             <a:fld id="{2C6472F1-65FD-204C-A27D-A96ACCC3B0AE}" type="datetimeFigureOut">
               <a:rPr lang="en-US" smtClean="0"/>
-              <a:t>21/02/2018</a:t>
+              <a:t>22/02/2018</a:t>
             </a:fld>
             <a:endParaRPr lang="en-US"/>
           </a:p>
@@ -2565,6 +2651,14 @@
   <p:clrMapOvr>
     <a:masterClrMapping/>
   </p:clrMapOvr>
+  <mc:AlternateContent xmlns:mc="http://schemas.openxmlformats.org/markup-compatibility/2006">
+    <mc:Choice xmlns:p14="http://schemas.microsoft.com/office/powerpoint/2010/main" Requires="p14">
+      <p:transition spd="slow" p14:dur="2000" advTm="5000"/>
+    </mc:Choice>
+    <mc:Fallback>
+      <p:transition xmlns:p14="http://schemas.microsoft.com/office/powerpoint/2010/main" spd="slow" advTm="5000"/>
+    </mc:Fallback>
+  </mc:AlternateContent>
 </p:sldLayout>
 </file>
 
@@ -2720,7 +2814,7 @@
           <a:p>
             <a:fld id="{2C6472F1-65FD-204C-A27D-A96ACCC3B0AE}" type="datetimeFigureOut">
               <a:rPr lang="en-US" smtClean="0"/>
-              <a:t>21/02/2018</a:t>
+              <a:t>22/02/2018</a:t>
             </a:fld>
             <a:endParaRPr lang="en-US"/>
           </a:p>
@@ -2825,6 +2919,14 @@
     <p:sldLayoutId id="2147483658" r:id="rId10"/>
     <p:sldLayoutId id="2147483659" r:id="rId11"/>
   </p:sldLayoutIdLst>
+  <mc:AlternateContent xmlns:mc="http://schemas.openxmlformats.org/markup-compatibility/2006">
+    <mc:Choice xmlns:p14="http://schemas.microsoft.com/office/powerpoint/2010/main" Requires="p14">
+      <p:transition spd="slow" p14:dur="2000" advTm="5000"/>
+    </mc:Choice>
+    <mc:Fallback>
+      <p:transition xmlns:p14="http://schemas.microsoft.com/office/powerpoint/2010/main" spd="slow" advTm="5000"/>
+    </mc:Fallback>
+  </mc:AlternateContent>
   <p:txStyles>
     <p:titleStyle>
       <a:lvl1pPr algn="ctr" defTabSz="457200" rtl="0" eaLnBrk="1" latinLnBrk="0" hangingPunct="1">
@@ -3095,6 +3197,2190 @@
           <a:chExt cx="0" cy="0"/>
         </a:xfrm>
       </p:grpSpPr>
+      <p:sp>
+        <p:nvSpPr>
+          <p:cNvPr id="2" name="Title 1"/>
+          <p:cNvSpPr>
+            <a:spLocks noGrp="1"/>
+          </p:cNvSpPr>
+          <p:nvPr>
+            <p:ph type="title"/>
+          </p:nvPr>
+        </p:nvSpPr>
+        <p:spPr/>
+        <p:txBody>
+          <a:bodyPr/>
+          <a:lstStyle/>
+          <a:p>
+            <a:r>
+              <a:rPr lang="en-US" dirty="0" err="1" smtClean="0"/>
+              <a:t>ContentMine</a:t>
+            </a:r>
+            <a:r>
+              <a:rPr lang="en-US" dirty="0" smtClean="0"/>
+              <a:t> ca</a:t>
+            </a:r>
+            <a:r>
+              <a:rPr lang="en-US" dirty="0" smtClean="0"/>
+              <a:t>n</a:t>
+            </a:r>
+            <a:endParaRPr lang="en-US" dirty="0"/>
+          </a:p>
+        </p:txBody>
+      </p:sp>
+      <p:sp>
+        <p:nvSpPr>
+          <p:cNvPr id="3" name="Content Placeholder 2"/>
+          <p:cNvSpPr>
+            <a:spLocks noGrp="1"/>
+          </p:cNvSpPr>
+          <p:nvPr>
+            <p:ph idx="1"/>
+          </p:nvPr>
+        </p:nvSpPr>
+        <p:spPr/>
+        <p:txBody>
+          <a:bodyPr/>
+          <a:lstStyle/>
+          <a:p>
+            <a:r>
+              <a:rPr lang="en-US" dirty="0" smtClean="0"/>
+              <a:t>Automatically convert your PDFs into semantic (computable</a:t>
+            </a:r>
+            <a:r>
+              <a:rPr lang="en-US" dirty="0" smtClean="0"/>
+              <a:t>) form</a:t>
+            </a:r>
+            <a:endParaRPr lang="en-US" dirty="0" smtClean="0"/>
+          </a:p>
+          <a:p>
+            <a:r>
+              <a:rPr lang="en-US" dirty="0" smtClean="0"/>
+              <a:t>Identify the different parts of the </a:t>
+            </a:r>
+            <a:r>
+              <a:rPr lang="en-US" dirty="0" smtClean="0"/>
+              <a:t>article (equations and tables)</a:t>
+            </a:r>
+          </a:p>
+          <a:p>
+            <a:r>
+              <a:rPr lang="en-US" dirty="0" smtClean="0"/>
+              <a:t>Gather them into a computable metabolic network</a:t>
+            </a:r>
+            <a:endParaRPr lang="en-US" dirty="0"/>
+          </a:p>
+        </p:txBody>
+      </p:sp>
+    </p:spTree>
+    <p:extLst>
+      <p:ext uri="{BB962C8B-B14F-4D97-AF65-F5344CB8AC3E}">
+        <p14:creationId xmlns:p14="http://schemas.microsoft.com/office/powerpoint/2010/main" val="3867975539"/>
+      </p:ext>
+    </p:extLst>
+  </p:cSld>
+  <p:clrMapOvr>
+    <a:masterClrMapping/>
+  </p:clrMapOvr>
+  <mc:AlternateContent xmlns:mc="http://schemas.openxmlformats.org/markup-compatibility/2006">
+    <mc:Choice xmlns:p14="http://schemas.microsoft.com/office/powerpoint/2010/main" Requires="p14">
+      <p:transition spd="slow" p14:dur="2000" advTm="5000"/>
+    </mc:Choice>
+    <mc:Fallback>
+      <p:transition xmlns:p14="http://schemas.microsoft.com/office/powerpoint/2010/main" spd="slow" advTm="5000"/>
+    </mc:Fallback>
+  </mc:AlternateContent>
+  <p:timing>
+    <p:tnLst>
+      <p:par>
+        <p:cTn xmlns:p14="http://schemas.microsoft.com/office/powerpoint/2010/main" id="1" dur="indefinite" restart="never" nodeType="tmRoot"/>
+      </p:par>
+    </p:tnLst>
+  </p:timing>
+</p:sld>
+</file>
+
+<file path=ppt/slides/slide2.xml><?xml version="1.0" encoding="utf-8"?>
+<p:sld xmlns:a="http://schemas.openxmlformats.org/drawingml/2006/main" xmlns:r="http://schemas.openxmlformats.org/officeDocument/2006/relationships" xmlns:p="http://schemas.openxmlformats.org/presentationml/2006/main">
+  <p:cSld>
+    <p:spTree>
+      <p:nvGrpSpPr>
+        <p:cNvPr id="1" name=""/>
+        <p:cNvGrpSpPr/>
+        <p:nvPr/>
+      </p:nvGrpSpPr>
+      <p:grpSpPr>
+        <a:xfrm>
+          <a:off x="0" y="0"/>
+          <a:ext cx="0" cy="0"/>
+          <a:chOff x="0" y="0"/>
+          <a:chExt cx="0" cy="0"/>
+        </a:xfrm>
+      </p:grpSpPr>
+      <p:sp>
+        <p:nvSpPr>
+          <p:cNvPr id="2" name="Title 1"/>
+          <p:cNvSpPr>
+            <a:spLocks noGrp="1"/>
+          </p:cNvSpPr>
+          <p:nvPr>
+            <p:ph type="title"/>
+          </p:nvPr>
+        </p:nvSpPr>
+        <p:spPr/>
+        <p:txBody>
+          <a:bodyPr>
+            <a:normAutofit fontScale="90000"/>
+          </a:bodyPr>
+          <a:lstStyle/>
+          <a:p>
+            <a:r>
+              <a:rPr lang="en-US" dirty="0" smtClean="0"/>
+              <a:t>Extraction of </a:t>
+            </a:r>
+            <a:r>
+              <a:rPr lang="en-US" dirty="0" smtClean="0"/>
+              <a:t>equations (of metabolic networks) </a:t>
+            </a:r>
+            <a:r>
+              <a:rPr lang="en-US" dirty="0" smtClean="0"/>
+              <a:t>from </a:t>
+            </a:r>
+            <a:r>
+              <a:rPr lang="en-US" dirty="0" smtClean="0"/>
+              <a:t>PDFs</a:t>
+            </a:r>
+            <a:endParaRPr lang="en-US" dirty="0"/>
+          </a:p>
+        </p:txBody>
+      </p:sp>
+      <p:sp>
+        <p:nvSpPr>
+          <p:cNvPr id="3" name="Content Placeholder 2"/>
+          <p:cNvSpPr>
+            <a:spLocks noGrp="1"/>
+          </p:cNvSpPr>
+          <p:nvPr>
+            <p:ph idx="1"/>
+          </p:nvPr>
+        </p:nvSpPr>
+        <p:spPr>
+          <a:xfrm>
+            <a:off x="457200" y="1600200"/>
+            <a:ext cx="8229600" cy="5166105"/>
+          </a:xfrm>
+        </p:spPr>
+        <p:txBody>
+          <a:bodyPr>
+            <a:normAutofit/>
+          </a:bodyPr>
+          <a:lstStyle/>
+          <a:p>
+            <a:pPr marL="0" indent="0">
+              <a:buNone/>
+            </a:pPr>
+            <a:r>
+              <a:rPr lang="en-US" dirty="0"/>
+              <a:t>E</a:t>
+            </a:r>
+            <a:r>
+              <a:rPr lang="en-US" dirty="0" smtClean="0"/>
+              <a:t>xtract metabolic </a:t>
+            </a:r>
+            <a:r>
+              <a:rPr lang="en-US" dirty="0" smtClean="0"/>
+              <a:t>networks from articles in human-readable and machine computable form.</a:t>
+            </a:r>
+          </a:p>
+          <a:p>
+            <a:pPr lvl="1"/>
+            <a:r>
+              <a:rPr lang="en-US" dirty="0" smtClean="0"/>
+              <a:t>Check for errors in paper</a:t>
+            </a:r>
+          </a:p>
+          <a:p>
+            <a:pPr lvl="1"/>
+            <a:r>
+              <a:rPr lang="en-US" dirty="0" smtClean="0"/>
+              <a:t>Enhance experience for human reviewers </a:t>
+            </a:r>
+          </a:p>
+          <a:p>
+            <a:pPr lvl="1"/>
+            <a:r>
+              <a:rPr lang="en-US" dirty="0" smtClean="0"/>
+              <a:t>Add multidisciplinary knowledge</a:t>
+            </a:r>
+          </a:p>
+          <a:p>
+            <a:pPr marL="0" indent="0">
+              <a:buNone/>
+            </a:pPr>
+            <a:r>
+              <a:rPr lang="en-US" dirty="0" smtClean="0"/>
+              <a:t>Example: </a:t>
+            </a:r>
+            <a:br>
+              <a:rPr lang="en-US" dirty="0" smtClean="0"/>
+            </a:br>
+            <a:endParaRPr lang="en-US" dirty="0"/>
+          </a:p>
+          <a:p>
+            <a:pPr marL="457200" lvl="1" indent="0">
+              <a:buNone/>
+            </a:pPr>
+            <a:endParaRPr lang="en-US" dirty="0" smtClean="0"/>
+          </a:p>
+        </p:txBody>
+      </p:sp>
+      <p:pic>
+        <p:nvPicPr>
+          <p:cNvPr id="4" name="Picture 3" descr="Screen Shot 2018-02-22 at 09.20.51.png"/>
+          <p:cNvPicPr>
+            <a:picLocks noChangeAspect="1"/>
+          </p:cNvPicPr>
+          <p:nvPr/>
+        </p:nvPicPr>
+        <p:blipFill>
+          <a:blip r:embed="rId2">
+            <a:extLst>
+              <a:ext uri="{28A0092B-C50C-407E-A947-70E740481C1C}">
+                <a14:useLocalDpi xmlns:a14="http://schemas.microsoft.com/office/drawing/2010/main" val="0"/>
+              </a:ext>
+            </a:extLst>
+          </a:blip>
+          <a:stretch>
+            <a:fillRect/>
+          </a:stretch>
+        </p:blipFill>
+        <p:spPr>
+          <a:xfrm>
+            <a:off x="1688512" y="4802233"/>
+            <a:ext cx="5683646" cy="1758430"/>
+          </a:xfrm>
+          <a:prstGeom prst="rect">
+            <a:avLst/>
+          </a:prstGeom>
+          <a:ln>
+            <a:solidFill>
+              <a:srgbClr val="FF0000"/>
+            </a:solidFill>
+          </a:ln>
+        </p:spPr>
+      </p:pic>
+    </p:spTree>
+    <p:extLst>
+      <p:ext uri="{BB962C8B-B14F-4D97-AF65-F5344CB8AC3E}">
+        <p14:creationId xmlns:p14="http://schemas.microsoft.com/office/powerpoint/2010/main" val="3297318799"/>
+      </p:ext>
+    </p:extLst>
+  </p:cSld>
+  <p:clrMapOvr>
+    <a:masterClrMapping/>
+  </p:clrMapOvr>
+  <mc:AlternateContent xmlns:mc="http://schemas.openxmlformats.org/markup-compatibility/2006">
+    <mc:Choice xmlns:p14="http://schemas.microsoft.com/office/powerpoint/2010/main" Requires="p14">
+      <p:transition spd="slow" p14:dur="2000" advTm="5000"/>
+    </mc:Choice>
+    <mc:Fallback>
+      <p:transition xmlns:p14="http://schemas.microsoft.com/office/powerpoint/2010/main" spd="slow" advTm="5000"/>
+    </mc:Fallback>
+  </mc:AlternateContent>
+  <p:timing>
+    <p:tnLst>
+      <p:par>
+        <p:cTn xmlns:p14="http://schemas.microsoft.com/office/powerpoint/2010/main" id="1" dur="indefinite" restart="never" nodeType="tmRoot"/>
+      </p:par>
+    </p:tnLst>
+  </p:timing>
+</p:sld>
+</file>
+
+<file path=ppt/slides/slide3.xml><?xml version="1.0" encoding="utf-8"?>
+<p:sld xmlns:a="http://schemas.openxmlformats.org/drawingml/2006/main" xmlns:r="http://schemas.openxmlformats.org/officeDocument/2006/relationships" xmlns:p="http://schemas.openxmlformats.org/presentationml/2006/main">
+  <p:cSld>
+    <p:spTree>
+      <p:nvGrpSpPr>
+        <p:cNvPr id="1" name=""/>
+        <p:cNvGrpSpPr/>
+        <p:nvPr/>
+      </p:nvGrpSpPr>
+      <p:grpSpPr>
+        <a:xfrm>
+          <a:off x="0" y="0"/>
+          <a:ext cx="0" cy="0"/>
+          <a:chOff x="0" y="0"/>
+          <a:chExt cx="0" cy="0"/>
+        </a:xfrm>
+      </p:grpSpPr>
+      <p:pic>
+        <p:nvPicPr>
+          <p:cNvPr id="5" name="Picture 4" descr="Screen Shot 2018-02-22 at 08.41.41.png"/>
+          <p:cNvPicPr>
+            <a:picLocks noChangeAspect="1"/>
+          </p:cNvPicPr>
+          <p:nvPr/>
+        </p:nvPicPr>
+        <p:blipFill>
+          <a:blip r:embed="rId2">
+            <a:extLst>
+              <a:ext uri="{28A0092B-C50C-407E-A947-70E740481C1C}">
+                <a14:useLocalDpi xmlns:a14="http://schemas.microsoft.com/office/drawing/2010/main" val="0"/>
+              </a:ext>
+            </a:extLst>
+          </a:blip>
+          <a:stretch>
+            <a:fillRect/>
+          </a:stretch>
+        </p:blipFill>
+        <p:spPr>
+          <a:xfrm>
+            <a:off x="0" y="87589"/>
+            <a:ext cx="4907628" cy="2413850"/>
+          </a:xfrm>
+          <a:prstGeom prst="rect">
+            <a:avLst/>
+          </a:prstGeom>
+          <a:ln>
+            <a:solidFill>
+              <a:srgbClr val="008000"/>
+            </a:solidFill>
+          </a:ln>
+        </p:spPr>
+      </p:pic>
+      <p:pic>
+        <p:nvPicPr>
+          <p:cNvPr id="6" name="Picture 5" descr="Screen Shot 2018-02-22 at 08.42.12.png"/>
+          <p:cNvPicPr>
+            <a:picLocks noChangeAspect="1"/>
+          </p:cNvPicPr>
+          <p:nvPr/>
+        </p:nvPicPr>
+        <p:blipFill>
+          <a:blip r:embed="rId3">
+            <a:extLst>
+              <a:ext uri="{28A0092B-C50C-407E-A947-70E740481C1C}">
+                <a14:useLocalDpi xmlns:a14="http://schemas.microsoft.com/office/drawing/2010/main" val="0"/>
+              </a:ext>
+            </a:extLst>
+          </a:blip>
+          <a:stretch>
+            <a:fillRect/>
+          </a:stretch>
+        </p:blipFill>
+        <p:spPr>
+          <a:xfrm>
+            <a:off x="0" y="2501436"/>
+            <a:ext cx="4565312" cy="4356561"/>
+          </a:xfrm>
+          <a:prstGeom prst="rect">
+            <a:avLst/>
+          </a:prstGeom>
+          <a:ln>
+            <a:solidFill>
+              <a:srgbClr val="008000"/>
+            </a:solidFill>
+          </a:ln>
+        </p:spPr>
+      </p:pic>
+      <p:pic>
+        <p:nvPicPr>
+          <p:cNvPr id="7" name="Picture 6" descr="Screen Shot 2018-02-22 at 08.43.22.png"/>
+          <p:cNvPicPr>
+            <a:picLocks noChangeAspect="1"/>
+          </p:cNvPicPr>
+          <p:nvPr/>
+        </p:nvPicPr>
+        <p:blipFill>
+          <a:blip r:embed="rId4">
+            <a:extLst>
+              <a:ext uri="{28A0092B-C50C-407E-A947-70E740481C1C}">
+                <a14:useLocalDpi xmlns:a14="http://schemas.microsoft.com/office/drawing/2010/main" val="0"/>
+              </a:ext>
+            </a:extLst>
+          </a:blip>
+          <a:stretch>
+            <a:fillRect/>
+          </a:stretch>
+        </p:blipFill>
+        <p:spPr>
+          <a:xfrm>
+            <a:off x="5048068" y="87589"/>
+            <a:ext cx="3926007" cy="5605742"/>
+          </a:xfrm>
+          <a:prstGeom prst="rect">
+            <a:avLst/>
+          </a:prstGeom>
+          <a:ln>
+            <a:solidFill>
+              <a:srgbClr val="008000"/>
+            </a:solidFill>
+          </a:ln>
+        </p:spPr>
+      </p:pic>
+      <p:sp>
+        <p:nvSpPr>
+          <p:cNvPr id="55" name="TextBox 54"/>
+          <p:cNvSpPr txBox="1"/>
+          <p:nvPr/>
+        </p:nvSpPr>
+        <p:spPr>
+          <a:xfrm>
+            <a:off x="5048068" y="6021792"/>
+            <a:ext cx="3766175" cy="646331"/>
+          </a:xfrm>
+          <a:prstGeom prst="rect">
+            <a:avLst/>
+          </a:prstGeom>
+          <a:noFill/>
+        </p:spPr>
+        <p:txBody>
+          <a:bodyPr wrap="none" rtlCol="0">
+            <a:spAutoFit/>
+          </a:bodyPr>
+          <a:lstStyle/>
+          <a:p>
+            <a:r>
+              <a:rPr lang="en-US" dirty="0" smtClean="0"/>
+              <a:t>Metabolic network from Varga2001 in</a:t>
+            </a:r>
+          </a:p>
+          <a:p>
+            <a:r>
+              <a:rPr lang="en-US" dirty="0" smtClean="0"/>
+              <a:t>PDF table form</a:t>
+            </a:r>
+            <a:endParaRPr lang="en-US" dirty="0"/>
+          </a:p>
+        </p:txBody>
+      </p:sp>
+    </p:spTree>
+    <p:extLst>
+      <p:ext uri="{BB962C8B-B14F-4D97-AF65-F5344CB8AC3E}">
+        <p14:creationId xmlns:p14="http://schemas.microsoft.com/office/powerpoint/2010/main" val="3305235723"/>
+      </p:ext>
+    </p:extLst>
+  </p:cSld>
+  <p:clrMapOvr>
+    <a:masterClrMapping/>
+  </p:clrMapOvr>
+  <mc:AlternateContent xmlns:mc="http://schemas.openxmlformats.org/markup-compatibility/2006">
+    <mc:Choice xmlns:p14="http://schemas.microsoft.com/office/powerpoint/2010/main" Requires="p14">
+      <p:transition spd="slow" p14:dur="2000" advTm="5000"/>
+    </mc:Choice>
+    <mc:Fallback>
+      <p:transition xmlns:p14="http://schemas.microsoft.com/office/powerpoint/2010/main" spd="slow" advTm="5000"/>
+    </mc:Fallback>
+  </mc:AlternateContent>
+  <p:timing>
+    <p:tnLst>
+      <p:par>
+        <p:cTn xmlns:p14="http://schemas.microsoft.com/office/powerpoint/2010/main" id="1" dur="indefinite" restart="never" nodeType="tmRoot"/>
+      </p:par>
+    </p:tnLst>
+  </p:timing>
+</p:sld>
+</file>
+
+<file path=ppt/slides/slide4.xml><?xml version="1.0" encoding="utf-8"?>
+<p:sld xmlns:a="http://schemas.openxmlformats.org/drawingml/2006/main" xmlns:r="http://schemas.openxmlformats.org/officeDocument/2006/relationships" xmlns:p="http://schemas.openxmlformats.org/presentationml/2006/main">
+  <p:cSld>
+    <p:spTree>
+      <p:nvGrpSpPr>
+        <p:cNvPr id="1" name=""/>
+        <p:cNvGrpSpPr/>
+        <p:nvPr/>
+      </p:nvGrpSpPr>
+      <p:grpSpPr>
+        <a:xfrm>
+          <a:off x="0" y="0"/>
+          <a:ext cx="0" cy="0"/>
+          <a:chOff x="0" y="0"/>
+          <a:chExt cx="0" cy="0"/>
+        </a:xfrm>
+      </p:grpSpPr>
+      <p:pic>
+        <p:nvPicPr>
+          <p:cNvPr id="5" name="Picture 4" descr="Screen Shot 2018-02-22 at 08.41.41.png"/>
+          <p:cNvPicPr>
+            <a:picLocks noChangeAspect="1"/>
+          </p:cNvPicPr>
+          <p:nvPr/>
+        </p:nvPicPr>
+        <p:blipFill>
+          <a:blip r:embed="rId2">
+            <a:extLst>
+              <a:ext uri="{28A0092B-C50C-407E-A947-70E740481C1C}">
+                <a14:useLocalDpi xmlns:a14="http://schemas.microsoft.com/office/drawing/2010/main" val="0"/>
+              </a:ext>
+            </a:extLst>
+          </a:blip>
+          <a:stretch>
+            <a:fillRect/>
+          </a:stretch>
+        </p:blipFill>
+        <p:spPr>
+          <a:xfrm>
+            <a:off x="0" y="87589"/>
+            <a:ext cx="4907628" cy="2413850"/>
+          </a:xfrm>
+          <a:prstGeom prst="rect">
+            <a:avLst/>
+          </a:prstGeom>
+          <a:ln>
+            <a:solidFill>
+              <a:srgbClr val="008000"/>
+            </a:solidFill>
+          </a:ln>
+        </p:spPr>
+      </p:pic>
+      <p:pic>
+        <p:nvPicPr>
+          <p:cNvPr id="6" name="Picture 5" descr="Screen Shot 2018-02-22 at 08.42.12.png"/>
+          <p:cNvPicPr>
+            <a:picLocks noChangeAspect="1"/>
+          </p:cNvPicPr>
+          <p:nvPr/>
+        </p:nvPicPr>
+        <p:blipFill>
+          <a:blip r:embed="rId3">
+            <a:extLst>
+              <a:ext uri="{28A0092B-C50C-407E-A947-70E740481C1C}">
+                <a14:useLocalDpi xmlns:a14="http://schemas.microsoft.com/office/drawing/2010/main" val="0"/>
+              </a:ext>
+            </a:extLst>
+          </a:blip>
+          <a:stretch>
+            <a:fillRect/>
+          </a:stretch>
+        </p:blipFill>
+        <p:spPr>
+          <a:xfrm>
+            <a:off x="0" y="2501436"/>
+            <a:ext cx="4565312" cy="4356561"/>
+          </a:xfrm>
+          <a:prstGeom prst="rect">
+            <a:avLst/>
+          </a:prstGeom>
+          <a:ln>
+            <a:solidFill>
+              <a:srgbClr val="008000"/>
+            </a:solidFill>
+          </a:ln>
+        </p:spPr>
+      </p:pic>
+      <p:pic>
+        <p:nvPicPr>
+          <p:cNvPr id="7" name="Picture 6" descr="Screen Shot 2018-02-22 at 08.43.22.png"/>
+          <p:cNvPicPr>
+            <a:picLocks noChangeAspect="1"/>
+          </p:cNvPicPr>
+          <p:nvPr/>
+        </p:nvPicPr>
+        <p:blipFill>
+          <a:blip r:embed="rId4">
+            <a:extLst>
+              <a:ext uri="{28A0092B-C50C-407E-A947-70E740481C1C}">
+                <a14:useLocalDpi xmlns:a14="http://schemas.microsoft.com/office/drawing/2010/main" val="0"/>
+              </a:ext>
+            </a:extLst>
+          </a:blip>
+          <a:stretch>
+            <a:fillRect/>
+          </a:stretch>
+        </p:blipFill>
+        <p:spPr>
+          <a:xfrm>
+            <a:off x="5048068" y="87589"/>
+            <a:ext cx="3926007" cy="5605742"/>
+          </a:xfrm>
+          <a:prstGeom prst="rect">
+            <a:avLst/>
+          </a:prstGeom>
+          <a:ln>
+            <a:solidFill>
+              <a:srgbClr val="008000"/>
+            </a:solidFill>
+          </a:ln>
+        </p:spPr>
+      </p:pic>
+      <p:sp>
+        <p:nvSpPr>
+          <p:cNvPr id="55" name="TextBox 54"/>
+          <p:cNvSpPr txBox="1"/>
+          <p:nvPr/>
+        </p:nvSpPr>
+        <p:spPr>
+          <a:xfrm>
+            <a:off x="5048068" y="6021792"/>
+            <a:ext cx="3766175" cy="646331"/>
+          </a:xfrm>
+          <a:prstGeom prst="rect">
+            <a:avLst/>
+          </a:prstGeom>
+          <a:noFill/>
+        </p:spPr>
+        <p:txBody>
+          <a:bodyPr wrap="none" rtlCol="0">
+            <a:spAutoFit/>
+          </a:bodyPr>
+          <a:lstStyle/>
+          <a:p>
+            <a:r>
+              <a:rPr lang="en-US" dirty="0" smtClean="0"/>
+              <a:t>Metabolic network from Varga2001 in</a:t>
+            </a:r>
+          </a:p>
+          <a:p>
+            <a:r>
+              <a:rPr lang="en-US" dirty="0" smtClean="0"/>
+              <a:t>PDF table form</a:t>
+            </a:r>
+            <a:endParaRPr lang="en-US" dirty="0"/>
+          </a:p>
+        </p:txBody>
+      </p:sp>
+      <p:sp>
+        <p:nvSpPr>
+          <p:cNvPr id="2" name="TextBox 1"/>
+          <p:cNvSpPr txBox="1"/>
+          <p:nvPr/>
+        </p:nvSpPr>
+        <p:spPr>
+          <a:xfrm>
+            <a:off x="1270077" y="991451"/>
+            <a:ext cx="2652088" cy="584776"/>
+          </a:xfrm>
+          <a:prstGeom prst="rect">
+            <a:avLst/>
+          </a:prstGeom>
+          <a:solidFill>
+            <a:schemeClr val="bg1"/>
+          </a:solidFill>
+        </p:spPr>
+        <p:txBody>
+          <a:bodyPr wrap="none" rtlCol="0">
+            <a:spAutoFit/>
+          </a:bodyPr>
+          <a:lstStyle/>
+          <a:p>
+            <a:r>
+              <a:rPr lang="en-US" sz="3200" dirty="0" smtClean="0">
+                <a:solidFill>
+                  <a:srgbClr val="FF0000"/>
+                </a:solidFill>
+              </a:rPr>
+              <a:t>Rate constants</a:t>
+            </a:r>
+            <a:endParaRPr lang="en-US" sz="3200" dirty="0">
+              <a:solidFill>
+                <a:srgbClr val="FF0000"/>
+              </a:solidFill>
+            </a:endParaRPr>
+          </a:p>
+        </p:txBody>
+      </p:sp>
+      <p:sp>
+        <p:nvSpPr>
+          <p:cNvPr id="8" name="TextBox 7"/>
+          <p:cNvSpPr txBox="1"/>
+          <p:nvPr/>
+        </p:nvSpPr>
+        <p:spPr>
+          <a:xfrm>
+            <a:off x="1021400" y="4235702"/>
+            <a:ext cx="2327280" cy="1077218"/>
+          </a:xfrm>
+          <a:prstGeom prst="rect">
+            <a:avLst/>
+          </a:prstGeom>
+          <a:solidFill>
+            <a:schemeClr val="bg1"/>
+          </a:solidFill>
+        </p:spPr>
+        <p:txBody>
+          <a:bodyPr wrap="none" rtlCol="0">
+            <a:spAutoFit/>
+          </a:bodyPr>
+          <a:lstStyle/>
+          <a:p>
+            <a:r>
+              <a:rPr lang="en-US" sz="3200" dirty="0" smtClean="0">
+                <a:solidFill>
+                  <a:srgbClr val="FF0000"/>
+                </a:solidFill>
+              </a:rPr>
+              <a:t>Components </a:t>
+            </a:r>
+          </a:p>
+          <a:p>
+            <a:r>
+              <a:rPr lang="en-US" sz="3200" dirty="0" smtClean="0">
+                <a:solidFill>
+                  <a:srgbClr val="FF0000"/>
+                </a:solidFill>
+              </a:rPr>
+              <a:t>of the model</a:t>
+            </a:r>
+            <a:endParaRPr lang="en-US" sz="3200" dirty="0">
+              <a:solidFill>
+                <a:srgbClr val="FF0000"/>
+              </a:solidFill>
+            </a:endParaRPr>
+          </a:p>
+        </p:txBody>
+      </p:sp>
+      <p:sp>
+        <p:nvSpPr>
+          <p:cNvPr id="9" name="TextBox 8"/>
+          <p:cNvSpPr txBox="1"/>
+          <p:nvPr/>
+        </p:nvSpPr>
+        <p:spPr>
+          <a:xfrm>
+            <a:off x="5678350" y="1728627"/>
+            <a:ext cx="2057174" cy="1077218"/>
+          </a:xfrm>
+          <a:prstGeom prst="rect">
+            <a:avLst/>
+          </a:prstGeom>
+          <a:solidFill>
+            <a:schemeClr val="bg1"/>
+          </a:solidFill>
+        </p:spPr>
+        <p:txBody>
+          <a:bodyPr wrap="none" rtlCol="0">
+            <a:spAutoFit/>
+          </a:bodyPr>
+          <a:lstStyle/>
+          <a:p>
+            <a:r>
+              <a:rPr lang="en-US" sz="3200" dirty="0" smtClean="0">
+                <a:solidFill>
+                  <a:srgbClr val="FF0000"/>
+                </a:solidFill>
+              </a:rPr>
+              <a:t>Differential</a:t>
+            </a:r>
+          </a:p>
+          <a:p>
+            <a:r>
+              <a:rPr lang="en-US" sz="3200" dirty="0" smtClean="0">
+                <a:solidFill>
+                  <a:srgbClr val="FF0000"/>
+                </a:solidFill>
+              </a:rPr>
+              <a:t>Equations</a:t>
+            </a:r>
+            <a:endParaRPr lang="en-US" sz="3200" dirty="0">
+              <a:solidFill>
+                <a:srgbClr val="FF0000"/>
+              </a:solidFill>
+            </a:endParaRPr>
+          </a:p>
+        </p:txBody>
+      </p:sp>
+    </p:spTree>
+    <p:extLst>
+      <p:ext uri="{BB962C8B-B14F-4D97-AF65-F5344CB8AC3E}">
+        <p14:creationId xmlns:p14="http://schemas.microsoft.com/office/powerpoint/2010/main" val="1269248093"/>
+      </p:ext>
+    </p:extLst>
+  </p:cSld>
+  <p:clrMapOvr>
+    <a:masterClrMapping/>
+  </p:clrMapOvr>
+  <mc:AlternateContent xmlns:mc="http://schemas.openxmlformats.org/markup-compatibility/2006">
+    <mc:Choice xmlns:p14="http://schemas.microsoft.com/office/powerpoint/2010/main" Requires="p14">
+      <p:transition spd="slow" p14:dur="2000" advTm="5000"/>
+    </mc:Choice>
+    <mc:Fallback>
+      <p:transition xmlns:p14="http://schemas.microsoft.com/office/powerpoint/2010/main" spd="slow" advTm="5000"/>
+    </mc:Fallback>
+  </mc:AlternateContent>
+  <p:timing>
+    <p:tnLst>
+      <p:par>
+        <p:cTn xmlns:p14="http://schemas.microsoft.com/office/powerpoint/2010/main" id="1" dur="indefinite" restart="never" nodeType="tmRoot"/>
+      </p:par>
+    </p:tnLst>
+  </p:timing>
+</p:sld>
+</file>
+
+<file path=ppt/slides/slide5.xml><?xml version="1.0" encoding="utf-8"?>
+<p:sld xmlns:a="http://schemas.openxmlformats.org/drawingml/2006/main" xmlns:r="http://schemas.openxmlformats.org/officeDocument/2006/relationships" xmlns:p="http://schemas.openxmlformats.org/presentationml/2006/main">
+  <p:cSld>
+    <p:spTree>
+      <p:nvGrpSpPr>
+        <p:cNvPr id="1" name=""/>
+        <p:cNvGrpSpPr/>
+        <p:nvPr/>
+      </p:nvGrpSpPr>
+      <p:grpSpPr>
+        <a:xfrm>
+          <a:off x="0" y="0"/>
+          <a:ext cx="0" cy="0"/>
+          <a:chOff x="0" y="0"/>
+          <a:chExt cx="0" cy="0"/>
+        </a:xfrm>
+      </p:grpSpPr>
+      <p:pic>
+        <p:nvPicPr>
+          <p:cNvPr id="5" name="Picture 4" descr="Screen Shot 2018-02-22 at 08.41.41.png"/>
+          <p:cNvPicPr>
+            <a:picLocks noChangeAspect="1"/>
+          </p:cNvPicPr>
+          <p:nvPr/>
+        </p:nvPicPr>
+        <p:blipFill>
+          <a:blip r:embed="rId2">
+            <a:extLst>
+              <a:ext uri="{28A0092B-C50C-407E-A947-70E740481C1C}">
+                <a14:useLocalDpi xmlns:a14="http://schemas.microsoft.com/office/drawing/2010/main" val="0"/>
+              </a:ext>
+            </a:extLst>
+          </a:blip>
+          <a:stretch>
+            <a:fillRect/>
+          </a:stretch>
+        </p:blipFill>
+        <p:spPr>
+          <a:xfrm>
+            <a:off x="76634" y="87588"/>
+            <a:ext cx="4907628" cy="2413850"/>
+          </a:xfrm>
+          <a:prstGeom prst="rect">
+            <a:avLst/>
+          </a:prstGeom>
+          <a:ln>
+            <a:solidFill>
+              <a:srgbClr val="008000"/>
+            </a:solidFill>
+          </a:ln>
+        </p:spPr>
+      </p:pic>
+      <p:pic>
+        <p:nvPicPr>
+          <p:cNvPr id="6" name="Picture 5" descr="Screen Shot 2018-02-22 at 08.42.12.png"/>
+          <p:cNvPicPr>
+            <a:picLocks noChangeAspect="1"/>
+          </p:cNvPicPr>
+          <p:nvPr/>
+        </p:nvPicPr>
+        <p:blipFill>
+          <a:blip r:embed="rId3">
+            <a:extLst>
+              <a:ext uri="{28A0092B-C50C-407E-A947-70E740481C1C}">
+                <a14:useLocalDpi xmlns:a14="http://schemas.microsoft.com/office/drawing/2010/main" val="0"/>
+              </a:ext>
+            </a:extLst>
+          </a:blip>
+          <a:stretch>
+            <a:fillRect/>
+          </a:stretch>
+        </p:blipFill>
+        <p:spPr>
+          <a:xfrm>
+            <a:off x="197056" y="2501438"/>
+            <a:ext cx="4565312" cy="4356561"/>
+          </a:xfrm>
+          <a:prstGeom prst="rect">
+            <a:avLst/>
+          </a:prstGeom>
+          <a:ln>
+            <a:solidFill>
+              <a:srgbClr val="008000"/>
+            </a:solidFill>
+          </a:ln>
+        </p:spPr>
+      </p:pic>
+      <p:pic>
+        <p:nvPicPr>
+          <p:cNvPr id="7" name="Picture 6" descr="Screen Shot 2018-02-22 at 08.43.22.png"/>
+          <p:cNvPicPr>
+            <a:picLocks noChangeAspect="1"/>
+          </p:cNvPicPr>
+          <p:nvPr/>
+        </p:nvPicPr>
+        <p:blipFill>
+          <a:blip r:embed="rId4">
+            <a:extLst>
+              <a:ext uri="{28A0092B-C50C-407E-A947-70E740481C1C}">
+                <a14:useLocalDpi xmlns:a14="http://schemas.microsoft.com/office/drawing/2010/main" val="0"/>
+              </a:ext>
+            </a:extLst>
+          </a:blip>
+          <a:stretch>
+            <a:fillRect/>
+          </a:stretch>
+        </p:blipFill>
+        <p:spPr>
+          <a:xfrm>
+            <a:off x="5048068" y="87589"/>
+            <a:ext cx="3926007" cy="5605742"/>
+          </a:xfrm>
+          <a:prstGeom prst="rect">
+            <a:avLst/>
+          </a:prstGeom>
+          <a:ln>
+            <a:solidFill>
+              <a:srgbClr val="008000"/>
+            </a:solidFill>
+          </a:ln>
+        </p:spPr>
+      </p:pic>
+      <p:cxnSp>
+        <p:nvCxnSpPr>
+          <p:cNvPr id="9" name="Straight Arrow Connector 8"/>
+          <p:cNvCxnSpPr/>
+          <p:nvPr/>
+        </p:nvCxnSpPr>
+        <p:spPr>
+          <a:xfrm>
+            <a:off x="4904534" y="1916025"/>
+            <a:ext cx="2145734" cy="153282"/>
+          </a:xfrm>
+          <a:prstGeom prst="straightConnector1">
+            <a:avLst/>
+          </a:prstGeom>
+          <a:ln>
+            <a:solidFill>
+              <a:srgbClr val="660066"/>
+            </a:solidFill>
+            <a:tailEnd type="arrow"/>
+          </a:ln>
+        </p:spPr>
+        <p:style>
+          <a:lnRef idx="2">
+            <a:schemeClr val="accent1"/>
+          </a:lnRef>
+          <a:fillRef idx="0">
+            <a:schemeClr val="accent1"/>
+          </a:fillRef>
+          <a:effectRef idx="1">
+            <a:schemeClr val="accent1"/>
+          </a:effectRef>
+          <a:fontRef idx="minor">
+            <a:schemeClr val="tx1"/>
+          </a:fontRef>
+        </p:style>
+      </p:cxnSp>
+      <p:sp>
+        <p:nvSpPr>
+          <p:cNvPr id="10" name="Rectangle 9"/>
+          <p:cNvSpPr/>
+          <p:nvPr/>
+        </p:nvSpPr>
+        <p:spPr>
+          <a:xfrm>
+            <a:off x="197056" y="229923"/>
+            <a:ext cx="558330" cy="2124050"/>
+          </a:xfrm>
+          <a:prstGeom prst="rect">
+            <a:avLst/>
+          </a:prstGeom>
+          <a:noFill/>
+          <a:ln>
+            <a:solidFill>
+              <a:srgbClr val="FF0000"/>
+            </a:solidFill>
+          </a:ln>
+        </p:spPr>
+        <p:style>
+          <a:lnRef idx="1">
+            <a:schemeClr val="accent1"/>
+          </a:lnRef>
+          <a:fillRef idx="3">
+            <a:schemeClr val="accent1"/>
+          </a:fillRef>
+          <a:effectRef idx="2">
+            <a:schemeClr val="accent1"/>
+          </a:effectRef>
+          <a:fontRef idx="minor">
+            <a:schemeClr val="lt1"/>
+          </a:fontRef>
+        </p:style>
+        <p:txBody>
+          <a:bodyPr rtlCol="0" anchor="ctr"/>
+          <a:lstStyle/>
+          <a:p>
+            <a:pPr algn="ctr"/>
+            <a:endParaRPr lang="en-US">
+              <a:solidFill>
+                <a:srgbClr val="FF0000"/>
+              </a:solidFill>
+            </a:endParaRPr>
+          </a:p>
+        </p:txBody>
+      </p:sp>
+      <p:sp>
+        <p:nvSpPr>
+          <p:cNvPr id="11" name="Rectangle 10"/>
+          <p:cNvSpPr/>
+          <p:nvPr/>
+        </p:nvSpPr>
+        <p:spPr>
+          <a:xfrm>
+            <a:off x="3743218" y="229923"/>
+            <a:ext cx="1161316" cy="2124050"/>
+          </a:xfrm>
+          <a:prstGeom prst="rect">
+            <a:avLst/>
+          </a:prstGeom>
+          <a:noFill/>
+          <a:ln>
+            <a:solidFill>
+              <a:srgbClr val="FF0000"/>
+            </a:solidFill>
+          </a:ln>
+        </p:spPr>
+        <p:style>
+          <a:lnRef idx="1">
+            <a:schemeClr val="accent1"/>
+          </a:lnRef>
+          <a:fillRef idx="3">
+            <a:schemeClr val="accent1"/>
+          </a:fillRef>
+          <a:effectRef idx="2">
+            <a:schemeClr val="accent1"/>
+          </a:effectRef>
+          <a:fontRef idx="minor">
+            <a:schemeClr val="lt1"/>
+          </a:fontRef>
+        </p:style>
+        <p:txBody>
+          <a:bodyPr rtlCol="0" anchor="ctr"/>
+          <a:lstStyle/>
+          <a:p>
+            <a:pPr algn="ctr"/>
+            <a:endParaRPr lang="en-US">
+              <a:solidFill>
+                <a:srgbClr val="FF0000"/>
+              </a:solidFill>
+            </a:endParaRPr>
+          </a:p>
+        </p:txBody>
+      </p:sp>
+      <p:sp>
+        <p:nvSpPr>
+          <p:cNvPr id="13" name="TextBox 12"/>
+          <p:cNvSpPr txBox="1"/>
+          <p:nvPr/>
+        </p:nvSpPr>
+        <p:spPr>
+          <a:xfrm>
+            <a:off x="5048068" y="5827640"/>
+            <a:ext cx="1082348" cy="369332"/>
+          </a:xfrm>
+          <a:prstGeom prst="rect">
+            <a:avLst/>
+          </a:prstGeom>
+          <a:noFill/>
+          <a:ln>
+            <a:solidFill>
+              <a:srgbClr val="FF0000"/>
+            </a:solidFill>
+          </a:ln>
+        </p:spPr>
+        <p:txBody>
+          <a:bodyPr wrap="none" rtlCol="0">
+            <a:spAutoFit/>
+          </a:bodyPr>
+          <a:lstStyle/>
+          <a:p>
+            <a:r>
+              <a:rPr lang="en-US" dirty="0" smtClean="0"/>
+              <a:t>machines</a:t>
+            </a:r>
+            <a:endParaRPr lang="en-US" dirty="0"/>
+          </a:p>
+        </p:txBody>
+      </p:sp>
+      <p:sp>
+        <p:nvSpPr>
+          <p:cNvPr id="14" name="Rectangle 13"/>
+          <p:cNvSpPr/>
+          <p:nvPr/>
+        </p:nvSpPr>
+        <p:spPr>
+          <a:xfrm>
+            <a:off x="788230" y="229923"/>
+            <a:ext cx="1674986" cy="2124050"/>
+          </a:xfrm>
+          <a:prstGeom prst="rect">
+            <a:avLst/>
+          </a:prstGeom>
+          <a:noFill/>
+          <a:ln>
+            <a:solidFill>
+              <a:srgbClr val="3366FF"/>
+            </a:solidFill>
+          </a:ln>
+        </p:spPr>
+        <p:style>
+          <a:lnRef idx="1">
+            <a:schemeClr val="accent1"/>
+          </a:lnRef>
+          <a:fillRef idx="3">
+            <a:schemeClr val="accent1"/>
+          </a:fillRef>
+          <a:effectRef idx="2">
+            <a:schemeClr val="accent1"/>
+          </a:effectRef>
+          <a:fontRef idx="minor">
+            <a:schemeClr val="lt1"/>
+          </a:fontRef>
+        </p:style>
+        <p:txBody>
+          <a:bodyPr rtlCol="0" anchor="ctr"/>
+          <a:lstStyle/>
+          <a:p>
+            <a:pPr algn="ctr"/>
+            <a:endParaRPr lang="en-US"/>
+          </a:p>
+        </p:txBody>
+      </p:sp>
+      <p:sp>
+        <p:nvSpPr>
+          <p:cNvPr id="15" name="TextBox 14"/>
+          <p:cNvSpPr txBox="1"/>
+          <p:nvPr/>
+        </p:nvSpPr>
+        <p:spPr>
+          <a:xfrm>
+            <a:off x="5048068" y="6349372"/>
+            <a:ext cx="2112815" cy="369332"/>
+          </a:xfrm>
+          <a:prstGeom prst="rect">
+            <a:avLst/>
+          </a:prstGeom>
+          <a:noFill/>
+          <a:ln>
+            <a:solidFill>
+              <a:srgbClr val="0000FF"/>
+            </a:solidFill>
+          </a:ln>
+        </p:spPr>
+        <p:txBody>
+          <a:bodyPr wrap="none" rtlCol="0">
+            <a:spAutoFit/>
+          </a:bodyPr>
+          <a:lstStyle/>
+          <a:p>
+            <a:r>
+              <a:rPr lang="en-US" dirty="0" smtClean="0"/>
+              <a:t>Humans + Wikipedia</a:t>
+            </a:r>
+          </a:p>
+        </p:txBody>
+      </p:sp>
+      <p:sp>
+        <p:nvSpPr>
+          <p:cNvPr id="17" name="Rectangle 16"/>
+          <p:cNvSpPr/>
+          <p:nvPr/>
+        </p:nvSpPr>
+        <p:spPr>
+          <a:xfrm>
+            <a:off x="175161" y="1642309"/>
+            <a:ext cx="4729373" cy="273716"/>
+          </a:xfrm>
+          <a:prstGeom prst="rect">
+            <a:avLst/>
+          </a:prstGeom>
+          <a:noFill/>
+          <a:ln>
+            <a:solidFill>
+              <a:srgbClr val="660066"/>
+            </a:solidFill>
+          </a:ln>
+        </p:spPr>
+        <p:style>
+          <a:lnRef idx="1">
+            <a:schemeClr val="accent1"/>
+          </a:lnRef>
+          <a:fillRef idx="3">
+            <a:schemeClr val="accent1"/>
+          </a:fillRef>
+          <a:effectRef idx="2">
+            <a:schemeClr val="accent1"/>
+          </a:effectRef>
+          <a:fontRef idx="minor">
+            <a:schemeClr val="lt1"/>
+          </a:fontRef>
+        </p:style>
+        <p:txBody>
+          <a:bodyPr rtlCol="0" anchor="ctr"/>
+          <a:lstStyle/>
+          <a:p>
+            <a:pPr algn="ctr"/>
+            <a:endParaRPr lang="en-US"/>
+          </a:p>
+        </p:txBody>
+      </p:sp>
+      <p:sp>
+        <p:nvSpPr>
+          <p:cNvPr id="21" name="Rectangle 20"/>
+          <p:cNvSpPr/>
+          <p:nvPr/>
+        </p:nvSpPr>
+        <p:spPr>
+          <a:xfrm>
+            <a:off x="197056" y="5827640"/>
+            <a:ext cx="4389997" cy="142332"/>
+          </a:xfrm>
+          <a:prstGeom prst="rect">
+            <a:avLst/>
+          </a:prstGeom>
+          <a:noFill/>
+          <a:ln>
+            <a:solidFill>
+              <a:srgbClr val="008000"/>
+            </a:solidFill>
+          </a:ln>
+        </p:spPr>
+        <p:style>
+          <a:lnRef idx="1">
+            <a:schemeClr val="accent1"/>
+          </a:lnRef>
+          <a:fillRef idx="3">
+            <a:schemeClr val="accent1"/>
+          </a:fillRef>
+          <a:effectRef idx="2">
+            <a:schemeClr val="accent1"/>
+          </a:effectRef>
+          <a:fontRef idx="minor">
+            <a:schemeClr val="lt1"/>
+          </a:fontRef>
+        </p:style>
+        <p:txBody>
+          <a:bodyPr rtlCol="0" anchor="ctr"/>
+          <a:lstStyle/>
+          <a:p>
+            <a:pPr algn="ctr"/>
+            <a:endParaRPr lang="en-US"/>
+          </a:p>
+        </p:txBody>
+      </p:sp>
+      <p:cxnSp>
+        <p:nvCxnSpPr>
+          <p:cNvPr id="22" name="Straight Arrow Connector 21"/>
+          <p:cNvCxnSpPr/>
+          <p:nvPr/>
+        </p:nvCxnSpPr>
+        <p:spPr>
+          <a:xfrm flipV="1">
+            <a:off x="4587053" y="3175127"/>
+            <a:ext cx="952443" cy="2652513"/>
+          </a:xfrm>
+          <a:prstGeom prst="straightConnector1">
+            <a:avLst/>
+          </a:prstGeom>
+          <a:ln>
+            <a:solidFill>
+              <a:srgbClr val="008000"/>
+            </a:solidFill>
+            <a:tailEnd type="arrow"/>
+          </a:ln>
+        </p:spPr>
+        <p:style>
+          <a:lnRef idx="2">
+            <a:schemeClr val="accent1"/>
+          </a:lnRef>
+          <a:fillRef idx="0">
+            <a:schemeClr val="accent1"/>
+          </a:fillRef>
+          <a:effectRef idx="1">
+            <a:schemeClr val="accent1"/>
+          </a:effectRef>
+          <a:fontRef idx="minor">
+            <a:schemeClr val="tx1"/>
+          </a:fontRef>
+        </p:style>
+      </p:cxnSp>
+      <p:sp>
+        <p:nvSpPr>
+          <p:cNvPr id="24" name="Rectangle 23"/>
+          <p:cNvSpPr/>
+          <p:nvPr/>
+        </p:nvSpPr>
+        <p:spPr>
+          <a:xfrm>
+            <a:off x="5050830" y="3065642"/>
+            <a:ext cx="1079585" cy="142332"/>
+          </a:xfrm>
+          <a:prstGeom prst="rect">
+            <a:avLst/>
+          </a:prstGeom>
+          <a:noFill/>
+          <a:ln>
+            <a:solidFill>
+              <a:srgbClr val="008000"/>
+            </a:solidFill>
+          </a:ln>
+        </p:spPr>
+        <p:style>
+          <a:lnRef idx="1">
+            <a:schemeClr val="accent1"/>
+          </a:lnRef>
+          <a:fillRef idx="3">
+            <a:schemeClr val="accent1"/>
+          </a:fillRef>
+          <a:effectRef idx="2">
+            <a:schemeClr val="accent1"/>
+          </a:effectRef>
+          <a:fontRef idx="minor">
+            <a:schemeClr val="lt1"/>
+          </a:fontRef>
+        </p:style>
+        <p:txBody>
+          <a:bodyPr rtlCol="0" anchor="ctr"/>
+          <a:lstStyle/>
+          <a:p>
+            <a:pPr algn="ctr"/>
+            <a:endParaRPr lang="en-US"/>
+          </a:p>
+        </p:txBody>
+      </p:sp>
+      <p:sp>
+        <p:nvSpPr>
+          <p:cNvPr id="25" name="Rectangle 24"/>
+          <p:cNvSpPr/>
+          <p:nvPr/>
+        </p:nvSpPr>
+        <p:spPr>
+          <a:xfrm>
+            <a:off x="7699287" y="3053812"/>
+            <a:ext cx="1079585" cy="142332"/>
+          </a:xfrm>
+          <a:prstGeom prst="rect">
+            <a:avLst/>
+          </a:prstGeom>
+          <a:noFill/>
+          <a:ln>
+            <a:solidFill>
+              <a:srgbClr val="008000"/>
+            </a:solidFill>
+          </a:ln>
+        </p:spPr>
+        <p:style>
+          <a:lnRef idx="1">
+            <a:schemeClr val="accent1"/>
+          </a:lnRef>
+          <a:fillRef idx="3">
+            <a:schemeClr val="accent1"/>
+          </a:fillRef>
+          <a:effectRef idx="2">
+            <a:schemeClr val="accent1"/>
+          </a:effectRef>
+          <a:fontRef idx="minor">
+            <a:schemeClr val="lt1"/>
+          </a:fontRef>
+        </p:style>
+        <p:txBody>
+          <a:bodyPr rtlCol="0" anchor="ctr"/>
+          <a:lstStyle/>
+          <a:p>
+            <a:pPr algn="ctr"/>
+            <a:endParaRPr lang="en-US"/>
+          </a:p>
+        </p:txBody>
+      </p:sp>
+      <p:sp>
+        <p:nvSpPr>
+          <p:cNvPr id="27" name="Rectangle 26"/>
+          <p:cNvSpPr/>
+          <p:nvPr/>
+        </p:nvSpPr>
+        <p:spPr>
+          <a:xfrm>
+            <a:off x="7490414" y="2009090"/>
+            <a:ext cx="1079585" cy="142332"/>
+          </a:xfrm>
+          <a:prstGeom prst="rect">
+            <a:avLst/>
+          </a:prstGeom>
+          <a:noFill/>
+          <a:ln>
+            <a:solidFill>
+              <a:srgbClr val="008000"/>
+            </a:solidFill>
+          </a:ln>
+        </p:spPr>
+        <p:style>
+          <a:lnRef idx="1">
+            <a:schemeClr val="accent1"/>
+          </a:lnRef>
+          <a:fillRef idx="3">
+            <a:schemeClr val="accent1"/>
+          </a:fillRef>
+          <a:effectRef idx="2">
+            <a:schemeClr val="accent1"/>
+          </a:effectRef>
+          <a:fontRef idx="minor">
+            <a:schemeClr val="lt1"/>
+          </a:fontRef>
+        </p:style>
+        <p:txBody>
+          <a:bodyPr rtlCol="0" anchor="ctr"/>
+          <a:lstStyle/>
+          <a:p>
+            <a:pPr algn="ctr"/>
+            <a:endParaRPr lang="en-US"/>
+          </a:p>
+        </p:txBody>
+      </p:sp>
+      <p:cxnSp>
+        <p:nvCxnSpPr>
+          <p:cNvPr id="29" name="Straight Arrow Connector 28"/>
+          <p:cNvCxnSpPr/>
+          <p:nvPr/>
+        </p:nvCxnSpPr>
+        <p:spPr>
+          <a:xfrm flipV="1">
+            <a:off x="4587053" y="3196144"/>
+            <a:ext cx="3218600" cy="2631496"/>
+          </a:xfrm>
+          <a:prstGeom prst="straightConnector1">
+            <a:avLst/>
+          </a:prstGeom>
+          <a:ln>
+            <a:solidFill>
+              <a:srgbClr val="008000"/>
+            </a:solidFill>
+            <a:tailEnd type="arrow"/>
+          </a:ln>
+        </p:spPr>
+        <p:style>
+          <a:lnRef idx="2">
+            <a:schemeClr val="accent1"/>
+          </a:lnRef>
+          <a:fillRef idx="0">
+            <a:schemeClr val="accent1"/>
+          </a:fillRef>
+          <a:effectRef idx="1">
+            <a:schemeClr val="accent1"/>
+          </a:effectRef>
+          <a:fontRef idx="minor">
+            <a:schemeClr val="tx1"/>
+          </a:fontRef>
+        </p:style>
+      </p:cxnSp>
+      <p:cxnSp>
+        <p:nvCxnSpPr>
+          <p:cNvPr id="32" name="Straight Arrow Connector 31"/>
+          <p:cNvCxnSpPr>
+            <a:stCxn id="21" idx="3"/>
+          </p:cNvCxnSpPr>
+          <p:nvPr/>
+        </p:nvCxnSpPr>
+        <p:spPr>
+          <a:xfrm flipV="1">
+            <a:off x="4587053" y="2151422"/>
+            <a:ext cx="3218600" cy="3747384"/>
+          </a:xfrm>
+          <a:prstGeom prst="straightConnector1">
+            <a:avLst/>
+          </a:prstGeom>
+          <a:ln>
+            <a:solidFill>
+              <a:srgbClr val="008000"/>
+            </a:solidFill>
+            <a:tailEnd type="arrow"/>
+          </a:ln>
+        </p:spPr>
+        <p:style>
+          <a:lnRef idx="2">
+            <a:schemeClr val="accent1"/>
+          </a:lnRef>
+          <a:fillRef idx="0">
+            <a:schemeClr val="accent1"/>
+          </a:fillRef>
+          <a:effectRef idx="1">
+            <a:schemeClr val="accent1"/>
+          </a:effectRef>
+          <a:fontRef idx="minor">
+            <a:schemeClr val="tx1"/>
+          </a:fontRef>
+        </p:style>
+      </p:cxnSp>
+      <p:sp>
+        <p:nvSpPr>
+          <p:cNvPr id="36" name="Rectangle 35"/>
+          <p:cNvSpPr/>
+          <p:nvPr/>
+        </p:nvSpPr>
+        <p:spPr>
+          <a:xfrm>
+            <a:off x="6995528" y="2009090"/>
+            <a:ext cx="505832" cy="178610"/>
+          </a:xfrm>
+          <a:prstGeom prst="rect">
+            <a:avLst/>
+          </a:prstGeom>
+          <a:noFill/>
+          <a:ln>
+            <a:solidFill>
+              <a:srgbClr val="660066"/>
+            </a:solidFill>
+          </a:ln>
+        </p:spPr>
+        <p:style>
+          <a:lnRef idx="1">
+            <a:schemeClr val="accent1"/>
+          </a:lnRef>
+          <a:fillRef idx="3">
+            <a:schemeClr val="accent1"/>
+          </a:fillRef>
+          <a:effectRef idx="2">
+            <a:schemeClr val="accent1"/>
+          </a:effectRef>
+          <a:fontRef idx="minor">
+            <a:schemeClr val="lt1"/>
+          </a:fontRef>
+        </p:style>
+        <p:txBody>
+          <a:bodyPr rtlCol="0" anchor="ctr"/>
+          <a:lstStyle/>
+          <a:p>
+            <a:pPr algn="ctr"/>
+            <a:endParaRPr lang="en-US"/>
+          </a:p>
+        </p:txBody>
+      </p:sp>
+      <p:sp>
+        <p:nvSpPr>
+          <p:cNvPr id="37" name="Rectangle 36"/>
+          <p:cNvSpPr/>
+          <p:nvPr/>
+        </p:nvSpPr>
+        <p:spPr>
+          <a:xfrm>
+            <a:off x="6995528" y="1830480"/>
+            <a:ext cx="505832" cy="178610"/>
+          </a:xfrm>
+          <a:prstGeom prst="rect">
+            <a:avLst/>
+          </a:prstGeom>
+          <a:noFill/>
+          <a:ln>
+            <a:solidFill>
+              <a:srgbClr val="660066"/>
+            </a:solidFill>
+          </a:ln>
+        </p:spPr>
+        <p:style>
+          <a:lnRef idx="1">
+            <a:schemeClr val="accent1"/>
+          </a:lnRef>
+          <a:fillRef idx="3">
+            <a:schemeClr val="accent1"/>
+          </a:fillRef>
+          <a:effectRef idx="2">
+            <a:schemeClr val="accent1"/>
+          </a:effectRef>
+          <a:fontRef idx="minor">
+            <a:schemeClr val="lt1"/>
+          </a:fontRef>
+        </p:style>
+        <p:txBody>
+          <a:bodyPr rtlCol="0" anchor="ctr"/>
+          <a:lstStyle/>
+          <a:p>
+            <a:pPr algn="ctr"/>
+            <a:endParaRPr lang="en-US"/>
+          </a:p>
+        </p:txBody>
+      </p:sp>
+      <p:sp>
+        <p:nvSpPr>
+          <p:cNvPr id="38" name="Rectangle 37"/>
+          <p:cNvSpPr/>
+          <p:nvPr/>
+        </p:nvSpPr>
+        <p:spPr>
+          <a:xfrm>
+            <a:off x="7400844" y="1307491"/>
+            <a:ext cx="505832" cy="178610"/>
+          </a:xfrm>
+          <a:prstGeom prst="rect">
+            <a:avLst/>
+          </a:prstGeom>
+          <a:noFill/>
+          <a:ln>
+            <a:solidFill>
+              <a:srgbClr val="660066"/>
+            </a:solidFill>
+          </a:ln>
+        </p:spPr>
+        <p:style>
+          <a:lnRef idx="1">
+            <a:schemeClr val="accent1"/>
+          </a:lnRef>
+          <a:fillRef idx="3">
+            <a:schemeClr val="accent1"/>
+          </a:fillRef>
+          <a:effectRef idx="2">
+            <a:schemeClr val="accent1"/>
+          </a:effectRef>
+          <a:fontRef idx="minor">
+            <a:schemeClr val="lt1"/>
+          </a:fontRef>
+        </p:style>
+        <p:txBody>
+          <a:bodyPr rtlCol="0" anchor="ctr"/>
+          <a:lstStyle/>
+          <a:p>
+            <a:pPr algn="ctr"/>
+            <a:endParaRPr lang="en-US"/>
+          </a:p>
+        </p:txBody>
+      </p:sp>
+      <p:cxnSp>
+        <p:nvCxnSpPr>
+          <p:cNvPr id="39" name="Straight Arrow Connector 38"/>
+          <p:cNvCxnSpPr>
+            <a:endCxn id="38" idx="1"/>
+          </p:cNvCxnSpPr>
+          <p:nvPr/>
+        </p:nvCxnSpPr>
+        <p:spPr>
+          <a:xfrm flipV="1">
+            <a:off x="4908945" y="1396796"/>
+            <a:ext cx="2491899" cy="496450"/>
+          </a:xfrm>
+          <a:prstGeom prst="straightConnector1">
+            <a:avLst/>
+          </a:prstGeom>
+          <a:ln>
+            <a:solidFill>
+              <a:srgbClr val="660066"/>
+            </a:solidFill>
+            <a:tailEnd type="arrow"/>
+          </a:ln>
+        </p:spPr>
+        <p:style>
+          <a:lnRef idx="2">
+            <a:schemeClr val="accent1"/>
+          </a:lnRef>
+          <a:fillRef idx="0">
+            <a:schemeClr val="accent1"/>
+          </a:fillRef>
+          <a:effectRef idx="1">
+            <a:schemeClr val="accent1"/>
+          </a:effectRef>
+          <a:fontRef idx="minor">
+            <a:schemeClr val="tx1"/>
+          </a:fontRef>
+        </p:style>
+      </p:cxnSp>
+      <p:cxnSp>
+        <p:nvCxnSpPr>
+          <p:cNvPr id="40" name="Straight Arrow Connector 39"/>
+          <p:cNvCxnSpPr>
+            <a:endCxn id="37" idx="1"/>
+          </p:cNvCxnSpPr>
+          <p:nvPr/>
+        </p:nvCxnSpPr>
+        <p:spPr>
+          <a:xfrm>
+            <a:off x="4955830" y="1893246"/>
+            <a:ext cx="2039698" cy="26539"/>
+          </a:xfrm>
+          <a:prstGeom prst="straightConnector1">
+            <a:avLst/>
+          </a:prstGeom>
+          <a:ln>
+            <a:solidFill>
+              <a:srgbClr val="660066"/>
+            </a:solidFill>
+            <a:tailEnd type="arrow"/>
+          </a:ln>
+        </p:spPr>
+        <p:style>
+          <a:lnRef idx="2">
+            <a:schemeClr val="accent1"/>
+          </a:lnRef>
+          <a:fillRef idx="0">
+            <a:schemeClr val="accent1"/>
+          </a:fillRef>
+          <a:effectRef idx="1">
+            <a:schemeClr val="accent1"/>
+          </a:effectRef>
+          <a:fontRef idx="minor">
+            <a:schemeClr val="tx1"/>
+          </a:fontRef>
+        </p:style>
+      </p:cxnSp>
+      <p:sp>
+        <p:nvSpPr>
+          <p:cNvPr id="44" name="Rectangle 43"/>
+          <p:cNvSpPr/>
+          <p:nvPr/>
+        </p:nvSpPr>
+        <p:spPr>
+          <a:xfrm>
+            <a:off x="174728" y="2670603"/>
+            <a:ext cx="1336044" cy="4187395"/>
+          </a:xfrm>
+          <a:prstGeom prst="rect">
+            <a:avLst/>
+          </a:prstGeom>
+          <a:noFill/>
+          <a:ln>
+            <a:solidFill>
+              <a:srgbClr val="FF0000"/>
+            </a:solidFill>
+          </a:ln>
+        </p:spPr>
+        <p:style>
+          <a:lnRef idx="1">
+            <a:schemeClr val="accent1"/>
+          </a:lnRef>
+          <a:fillRef idx="3">
+            <a:schemeClr val="accent1"/>
+          </a:fillRef>
+          <a:effectRef idx="2">
+            <a:schemeClr val="accent1"/>
+          </a:effectRef>
+          <a:fontRef idx="minor">
+            <a:schemeClr val="lt1"/>
+          </a:fontRef>
+        </p:style>
+        <p:txBody>
+          <a:bodyPr rtlCol="0" anchor="ctr"/>
+          <a:lstStyle/>
+          <a:p>
+            <a:pPr algn="ctr"/>
+            <a:endParaRPr lang="en-US">
+              <a:solidFill>
+                <a:srgbClr val="FF0000"/>
+              </a:solidFill>
+            </a:endParaRPr>
+          </a:p>
+        </p:txBody>
+      </p:sp>
+      <p:sp>
+        <p:nvSpPr>
+          <p:cNvPr id="46" name="Rectangle 45"/>
+          <p:cNvSpPr/>
+          <p:nvPr/>
+        </p:nvSpPr>
+        <p:spPr>
+          <a:xfrm>
+            <a:off x="1543616" y="2670602"/>
+            <a:ext cx="1423190" cy="4187397"/>
+          </a:xfrm>
+          <a:prstGeom prst="rect">
+            <a:avLst/>
+          </a:prstGeom>
+          <a:noFill/>
+          <a:ln>
+            <a:solidFill>
+              <a:srgbClr val="3366FF"/>
+            </a:solidFill>
+          </a:ln>
+        </p:spPr>
+        <p:style>
+          <a:lnRef idx="1">
+            <a:schemeClr val="accent1"/>
+          </a:lnRef>
+          <a:fillRef idx="3">
+            <a:schemeClr val="accent1"/>
+          </a:fillRef>
+          <a:effectRef idx="2">
+            <a:schemeClr val="accent1"/>
+          </a:effectRef>
+          <a:fontRef idx="minor">
+            <a:schemeClr val="lt1"/>
+          </a:fontRef>
+        </p:style>
+        <p:txBody>
+          <a:bodyPr rtlCol="0" anchor="ctr"/>
+          <a:lstStyle/>
+          <a:p>
+            <a:pPr algn="ctr"/>
+            <a:endParaRPr lang="en-US"/>
+          </a:p>
+        </p:txBody>
+      </p:sp>
+      <p:sp>
+        <p:nvSpPr>
+          <p:cNvPr id="47" name="Rectangle 46"/>
+          <p:cNvSpPr/>
+          <p:nvPr/>
+        </p:nvSpPr>
+        <p:spPr>
+          <a:xfrm>
+            <a:off x="2999650" y="2702566"/>
+            <a:ext cx="1674986" cy="4155432"/>
+          </a:xfrm>
+          <a:prstGeom prst="rect">
+            <a:avLst/>
+          </a:prstGeom>
+          <a:noFill/>
+          <a:ln>
+            <a:solidFill>
+              <a:srgbClr val="3366FF"/>
+            </a:solidFill>
+          </a:ln>
+        </p:spPr>
+        <p:style>
+          <a:lnRef idx="1">
+            <a:schemeClr val="accent1"/>
+          </a:lnRef>
+          <a:fillRef idx="3">
+            <a:schemeClr val="accent1"/>
+          </a:fillRef>
+          <a:effectRef idx="2">
+            <a:schemeClr val="accent1"/>
+          </a:effectRef>
+          <a:fontRef idx="minor">
+            <a:schemeClr val="lt1"/>
+          </a:fontRef>
+        </p:style>
+        <p:txBody>
+          <a:bodyPr rtlCol="0" anchor="ctr"/>
+          <a:lstStyle/>
+          <a:p>
+            <a:pPr algn="ctr"/>
+            <a:endParaRPr lang="en-US"/>
+          </a:p>
+        </p:txBody>
+      </p:sp>
+      <p:sp>
+        <p:nvSpPr>
+          <p:cNvPr id="48" name="TextBox 47"/>
+          <p:cNvSpPr txBox="1"/>
+          <p:nvPr/>
+        </p:nvSpPr>
+        <p:spPr>
+          <a:xfrm>
+            <a:off x="8585662" y="87589"/>
+            <a:ext cx="386419" cy="369332"/>
+          </a:xfrm>
+          <a:prstGeom prst="rect">
+            <a:avLst/>
+          </a:prstGeom>
+          <a:noFill/>
+          <a:ln>
+            <a:solidFill>
+              <a:srgbClr val="FF0000"/>
+            </a:solidFill>
+          </a:ln>
+        </p:spPr>
+        <p:txBody>
+          <a:bodyPr wrap="none" rtlCol="0">
+            <a:spAutoFit/>
+          </a:bodyPr>
+          <a:lstStyle/>
+          <a:p>
+            <a:r>
+              <a:rPr lang="en-US" b="1" dirty="0" smtClean="0">
+                <a:solidFill>
+                  <a:srgbClr val="FF0000"/>
+                </a:solidFill>
+              </a:rPr>
+              <a:t>M</a:t>
+            </a:r>
+            <a:endParaRPr lang="en-US" b="1" dirty="0">
+              <a:solidFill>
+                <a:srgbClr val="FF0000"/>
+              </a:solidFill>
+            </a:endParaRPr>
+          </a:p>
+        </p:txBody>
+      </p:sp>
+      <p:sp>
+        <p:nvSpPr>
+          <p:cNvPr id="49" name="TextBox 48"/>
+          <p:cNvSpPr txBox="1"/>
+          <p:nvPr/>
+        </p:nvSpPr>
+        <p:spPr>
+          <a:xfrm>
+            <a:off x="4474577" y="229923"/>
+            <a:ext cx="386419" cy="369332"/>
+          </a:xfrm>
+          <a:prstGeom prst="rect">
+            <a:avLst/>
+          </a:prstGeom>
+          <a:noFill/>
+          <a:ln>
+            <a:solidFill>
+              <a:srgbClr val="FF0000"/>
+            </a:solidFill>
+          </a:ln>
+        </p:spPr>
+        <p:txBody>
+          <a:bodyPr wrap="none" rtlCol="0">
+            <a:spAutoFit/>
+          </a:bodyPr>
+          <a:lstStyle/>
+          <a:p>
+            <a:r>
+              <a:rPr lang="en-US" b="1" dirty="0" smtClean="0">
+                <a:solidFill>
+                  <a:srgbClr val="FF0000"/>
+                </a:solidFill>
+              </a:rPr>
+              <a:t>M</a:t>
+            </a:r>
+            <a:endParaRPr lang="en-US" b="1" dirty="0">
+              <a:solidFill>
+                <a:srgbClr val="FF0000"/>
+              </a:solidFill>
+            </a:endParaRPr>
+          </a:p>
+        </p:txBody>
+      </p:sp>
+      <p:sp>
+        <p:nvSpPr>
+          <p:cNvPr id="50" name="TextBox 49"/>
+          <p:cNvSpPr txBox="1"/>
+          <p:nvPr/>
+        </p:nvSpPr>
+        <p:spPr>
+          <a:xfrm>
+            <a:off x="1082694" y="2696310"/>
+            <a:ext cx="386419" cy="369332"/>
+          </a:xfrm>
+          <a:prstGeom prst="rect">
+            <a:avLst/>
+          </a:prstGeom>
+          <a:noFill/>
+          <a:ln>
+            <a:solidFill>
+              <a:srgbClr val="FF0000"/>
+            </a:solidFill>
+          </a:ln>
+        </p:spPr>
+        <p:txBody>
+          <a:bodyPr wrap="none" rtlCol="0">
+            <a:spAutoFit/>
+          </a:bodyPr>
+          <a:lstStyle/>
+          <a:p>
+            <a:r>
+              <a:rPr lang="en-US" b="1" dirty="0" smtClean="0">
+                <a:solidFill>
+                  <a:srgbClr val="FF0000"/>
+                </a:solidFill>
+              </a:rPr>
+              <a:t>M</a:t>
+            </a:r>
+            <a:endParaRPr lang="en-US" b="1" dirty="0">
+              <a:solidFill>
+                <a:srgbClr val="FF0000"/>
+              </a:solidFill>
+            </a:endParaRPr>
+          </a:p>
+        </p:txBody>
+      </p:sp>
+      <p:sp>
+        <p:nvSpPr>
+          <p:cNvPr id="51" name="TextBox 50"/>
+          <p:cNvSpPr txBox="1"/>
+          <p:nvPr/>
+        </p:nvSpPr>
+        <p:spPr>
+          <a:xfrm>
+            <a:off x="401811" y="229923"/>
+            <a:ext cx="386419" cy="369332"/>
+          </a:xfrm>
+          <a:prstGeom prst="rect">
+            <a:avLst/>
+          </a:prstGeom>
+          <a:noFill/>
+          <a:ln>
+            <a:solidFill>
+              <a:srgbClr val="FF0000"/>
+            </a:solidFill>
+          </a:ln>
+        </p:spPr>
+        <p:txBody>
+          <a:bodyPr wrap="none" rtlCol="0">
+            <a:spAutoFit/>
+          </a:bodyPr>
+          <a:lstStyle/>
+          <a:p>
+            <a:r>
+              <a:rPr lang="en-US" b="1" dirty="0" smtClean="0">
+                <a:solidFill>
+                  <a:srgbClr val="FF0000"/>
+                </a:solidFill>
+              </a:rPr>
+              <a:t>M</a:t>
+            </a:r>
+            <a:endParaRPr lang="en-US" b="1" dirty="0">
+              <a:solidFill>
+                <a:srgbClr val="FF0000"/>
+              </a:solidFill>
+            </a:endParaRPr>
+          </a:p>
+        </p:txBody>
+      </p:sp>
+      <p:sp>
+        <p:nvSpPr>
+          <p:cNvPr id="52" name="TextBox 51"/>
+          <p:cNvSpPr txBox="1"/>
+          <p:nvPr/>
+        </p:nvSpPr>
+        <p:spPr>
+          <a:xfrm>
+            <a:off x="2455911" y="2702566"/>
+            <a:ext cx="543739" cy="369332"/>
+          </a:xfrm>
+          <a:prstGeom prst="rect">
+            <a:avLst/>
+          </a:prstGeom>
+          <a:noFill/>
+          <a:ln>
+            <a:solidFill>
+              <a:srgbClr val="0000FF"/>
+            </a:solidFill>
+          </a:ln>
+        </p:spPr>
+        <p:txBody>
+          <a:bodyPr wrap="none" rtlCol="0">
+            <a:spAutoFit/>
+          </a:bodyPr>
+          <a:lstStyle/>
+          <a:p>
+            <a:r>
+              <a:rPr lang="en-US" b="1" dirty="0" smtClean="0">
+                <a:solidFill>
+                  <a:srgbClr val="0000FF"/>
+                </a:solidFill>
+              </a:rPr>
+              <a:t>HW</a:t>
+            </a:r>
+          </a:p>
+        </p:txBody>
+      </p:sp>
+      <p:sp>
+        <p:nvSpPr>
+          <p:cNvPr id="53" name="TextBox 52"/>
+          <p:cNvSpPr txBox="1"/>
+          <p:nvPr/>
+        </p:nvSpPr>
+        <p:spPr>
+          <a:xfrm>
+            <a:off x="4120250" y="2702566"/>
+            <a:ext cx="543739" cy="369332"/>
+          </a:xfrm>
+          <a:prstGeom prst="rect">
+            <a:avLst/>
+          </a:prstGeom>
+          <a:noFill/>
+          <a:ln>
+            <a:solidFill>
+              <a:srgbClr val="0000FF"/>
+            </a:solidFill>
+          </a:ln>
+        </p:spPr>
+        <p:txBody>
+          <a:bodyPr wrap="none" rtlCol="0">
+            <a:spAutoFit/>
+          </a:bodyPr>
+          <a:lstStyle/>
+          <a:p>
+            <a:r>
+              <a:rPr lang="en-US" b="1" dirty="0" smtClean="0">
+                <a:solidFill>
+                  <a:srgbClr val="0000FF"/>
+                </a:solidFill>
+              </a:rPr>
+              <a:t>HW</a:t>
+            </a:r>
+          </a:p>
+        </p:txBody>
+      </p:sp>
+      <p:sp>
+        <p:nvSpPr>
+          <p:cNvPr id="54" name="TextBox 53"/>
+          <p:cNvSpPr txBox="1"/>
+          <p:nvPr/>
+        </p:nvSpPr>
+        <p:spPr>
+          <a:xfrm>
+            <a:off x="1919477" y="260121"/>
+            <a:ext cx="543739" cy="369332"/>
+          </a:xfrm>
+          <a:prstGeom prst="rect">
+            <a:avLst/>
+          </a:prstGeom>
+          <a:noFill/>
+          <a:ln>
+            <a:solidFill>
+              <a:srgbClr val="0000FF"/>
+            </a:solidFill>
+          </a:ln>
+        </p:spPr>
+        <p:txBody>
+          <a:bodyPr wrap="none" rtlCol="0">
+            <a:spAutoFit/>
+          </a:bodyPr>
+          <a:lstStyle/>
+          <a:p>
+            <a:r>
+              <a:rPr lang="en-US" b="1" dirty="0" smtClean="0">
+                <a:solidFill>
+                  <a:srgbClr val="0000FF"/>
+                </a:solidFill>
+              </a:rPr>
+              <a:t>HW</a:t>
+            </a:r>
+          </a:p>
+        </p:txBody>
+      </p:sp>
+    </p:spTree>
+    <p:extLst>
+      <p:ext uri="{BB962C8B-B14F-4D97-AF65-F5344CB8AC3E}">
+        <p14:creationId xmlns:p14="http://schemas.microsoft.com/office/powerpoint/2010/main" val="1586270546"/>
+      </p:ext>
+    </p:extLst>
+  </p:cSld>
+  <p:clrMapOvr>
+    <a:masterClrMapping/>
+  </p:clrMapOvr>
+  <mc:AlternateContent xmlns:mc="http://schemas.openxmlformats.org/markup-compatibility/2006">
+    <mc:Choice xmlns:p14="http://schemas.microsoft.com/office/powerpoint/2010/main" Requires="p14">
+      <p:transition spd="slow" p14:dur="2000" advTm="5000"/>
+    </mc:Choice>
+    <mc:Fallback>
+      <p:transition xmlns:p14="http://schemas.microsoft.com/office/powerpoint/2010/main" spd="slow" advTm="5000"/>
+    </mc:Fallback>
+  </mc:AlternateContent>
+  <p:timing>
+    <p:tnLst>
+      <p:par>
+        <p:cTn xmlns:p14="http://schemas.microsoft.com/office/powerpoint/2010/main" id="1" dur="indefinite" restart="never" nodeType="tmRoot"/>
+      </p:par>
+    </p:tnLst>
+  </p:timing>
+</p:sld>
+</file>
+
+<file path=ppt/slides/slide6.xml><?xml version="1.0" encoding="utf-8"?>
+<p:sld xmlns:a="http://schemas.openxmlformats.org/drawingml/2006/main" xmlns:r="http://schemas.openxmlformats.org/officeDocument/2006/relationships" xmlns:p="http://schemas.openxmlformats.org/presentationml/2006/main">
+  <p:cSld>
+    <p:spTree>
+      <p:nvGrpSpPr>
+        <p:cNvPr id="1" name=""/>
+        <p:cNvGrpSpPr/>
+        <p:nvPr/>
+      </p:nvGrpSpPr>
+      <p:grpSpPr>
+        <a:xfrm>
+          <a:off x="0" y="0"/>
+          <a:ext cx="0" cy="0"/>
+          <a:chOff x="0" y="0"/>
+          <a:chExt cx="0" cy="0"/>
+        </a:xfrm>
+      </p:grpSpPr>
       <p:pic>
         <p:nvPicPr>
           <p:cNvPr id="5" name="Picture 4" descr="Screen Shot 2018-02-21 at 11.51.51.png"/>
@@ -3285,11 +5571,7 @@
           <a:p>
             <a:r>
               <a:rPr lang="en-US" dirty="0" smtClean="0"/>
-              <a:t>Matching sources and sinks </a:t>
-            </a:r>
-            <a:r>
-              <a:rPr lang="en-US" smtClean="0"/>
-              <a:t>in flow, 3-&gt; 4</a:t>
+              <a:t>Matching sources and sinks in flow, 3-&gt; 4</a:t>
             </a:r>
             <a:endParaRPr lang="en-US" dirty="0"/>
           </a:p>
@@ -3305,6 +5587,176 @@
   <p:clrMapOvr>
     <a:masterClrMapping/>
   </p:clrMapOvr>
+  <mc:AlternateContent xmlns:mc="http://schemas.openxmlformats.org/markup-compatibility/2006">
+    <mc:Choice xmlns:p14="http://schemas.microsoft.com/office/powerpoint/2010/main" Requires="p14">
+      <p:transition spd="slow" p14:dur="2000" advTm="5000"/>
+    </mc:Choice>
+    <mc:Fallback>
+      <p:transition xmlns:p14="http://schemas.microsoft.com/office/powerpoint/2010/main" spd="slow" advTm="5000"/>
+    </mc:Fallback>
+  </mc:AlternateContent>
+  <p:timing>
+    <p:tnLst>
+      <p:par>
+        <p:cTn xmlns:p14="http://schemas.microsoft.com/office/powerpoint/2010/main" id="1" dur="indefinite" restart="never" nodeType="tmRoot"/>
+      </p:par>
+    </p:tnLst>
+  </p:timing>
+</p:sld>
+</file>
+
+<file path=ppt/slides/slide7.xml><?xml version="1.0" encoding="utf-8"?>
+<p:sld xmlns:a="http://schemas.openxmlformats.org/drawingml/2006/main" xmlns:r="http://schemas.openxmlformats.org/officeDocument/2006/relationships" xmlns:p="http://schemas.openxmlformats.org/presentationml/2006/main">
+  <p:cSld>
+    <p:spTree>
+      <p:nvGrpSpPr>
+        <p:cNvPr id="1" name=""/>
+        <p:cNvGrpSpPr/>
+        <p:nvPr/>
+      </p:nvGrpSpPr>
+      <p:grpSpPr>
+        <a:xfrm>
+          <a:off x="0" y="0"/>
+          <a:ext cx="0" cy="0"/>
+          <a:chOff x="0" y="0"/>
+          <a:chExt cx="0" cy="0"/>
+        </a:xfrm>
+      </p:grpSpPr>
+      <p:sp>
+        <p:nvSpPr>
+          <p:cNvPr id="2" name="Title 1"/>
+          <p:cNvSpPr>
+            <a:spLocks noGrp="1"/>
+          </p:cNvSpPr>
+          <p:nvPr>
+            <p:ph type="title"/>
+          </p:nvPr>
+        </p:nvSpPr>
+        <p:spPr/>
+        <p:txBody>
+          <a:bodyPr>
+            <a:normAutofit/>
+          </a:bodyPr>
+          <a:lstStyle/>
+          <a:p>
+            <a:r>
+              <a:rPr lang="en-US" dirty="0" smtClean="0"/>
+              <a:t>Machine-human </a:t>
+            </a:r>
+            <a:r>
+              <a:rPr lang="en-US" dirty="0" smtClean="0"/>
+              <a:t>assistance</a:t>
+            </a:r>
+            <a:endParaRPr lang="en-US" dirty="0"/>
+          </a:p>
+        </p:txBody>
+      </p:sp>
+      <p:sp>
+        <p:nvSpPr>
+          <p:cNvPr id="3" name="Content Placeholder 2"/>
+          <p:cNvSpPr>
+            <a:spLocks noGrp="1"/>
+          </p:cNvSpPr>
+          <p:nvPr>
+            <p:ph idx="1"/>
+          </p:nvPr>
+        </p:nvSpPr>
+        <p:spPr/>
+        <p:txBody>
+          <a:bodyPr>
+            <a:normAutofit lnSpcReduction="10000"/>
+          </a:bodyPr>
+          <a:lstStyle/>
+          <a:p>
+            <a:r>
+              <a:rPr lang="en-US" dirty="0" smtClean="0"/>
+              <a:t>Machine-assisted human review</a:t>
+            </a:r>
+          </a:p>
+          <a:p>
+            <a:pPr lvl="1"/>
+            <a:r>
+              <a:rPr lang="en-US" dirty="0" smtClean="0"/>
+              <a:t>Machines do the </a:t>
+            </a:r>
+            <a:r>
+              <a:rPr lang="en-US" dirty="0" smtClean="0"/>
+              <a:t>time-consuming, boring </a:t>
+            </a:r>
+            <a:r>
+              <a:rPr lang="en-US" dirty="0" smtClean="0"/>
+              <a:t>and error-prone parts</a:t>
+            </a:r>
+          </a:p>
+          <a:p>
+            <a:pPr lvl="1"/>
+            <a:r>
+              <a:rPr lang="en-US" dirty="0" smtClean="0"/>
+              <a:t>Machines link to additional knowledge</a:t>
+            </a:r>
+          </a:p>
+          <a:p>
+            <a:pPr lvl="1"/>
+            <a:r>
+              <a:rPr lang="en-US" dirty="0" smtClean="0"/>
+              <a:t>Machines compute properties</a:t>
+            </a:r>
+          </a:p>
+          <a:p>
+            <a:pPr lvl="1"/>
+            <a:r>
+              <a:rPr lang="en-US" dirty="0" smtClean="0"/>
+              <a:t>Machines spot errors in articles</a:t>
+            </a:r>
+          </a:p>
+          <a:p>
+            <a:r>
+              <a:rPr lang="en-US" dirty="0" smtClean="0"/>
+              <a:t>Human-assisted machine extraction</a:t>
+            </a:r>
+          </a:p>
+          <a:p>
+            <a:pPr lvl="1"/>
+            <a:r>
+              <a:rPr lang="en-US" dirty="0" smtClean="0"/>
+              <a:t>Humans decide in each paper what to extract</a:t>
+            </a:r>
+          </a:p>
+          <a:p>
+            <a:pPr lvl="1"/>
+            <a:r>
+              <a:rPr lang="en-US" dirty="0" smtClean="0"/>
+              <a:t>Humans decide whether quality is sufficient</a:t>
+            </a:r>
+            <a:endParaRPr lang="en-US" dirty="0"/>
+          </a:p>
+        </p:txBody>
+      </p:sp>
+    </p:spTree>
+    <p:extLst>
+      <p:ext uri="{BB962C8B-B14F-4D97-AF65-F5344CB8AC3E}">
+        <p14:creationId xmlns:p14="http://schemas.microsoft.com/office/powerpoint/2010/main" val="2204096075"/>
+      </p:ext>
+    </p:extLst>
+  </p:cSld>
+  <p:clrMapOvr>
+    <a:masterClrMapping/>
+  </p:clrMapOvr>
+  <mc:AlternateContent xmlns:mc="http://schemas.openxmlformats.org/markup-compatibility/2006">
+    <mc:Choice xmlns:p14="http://schemas.microsoft.com/office/powerpoint/2010/main" Requires="p14">
+      <p:transition spd="slow" p14:dur="2000" advTm="5000"/>
+    </mc:Choice>
+    <mc:Fallback>
+      <p:transition xmlns:p14="http://schemas.microsoft.com/office/powerpoint/2010/main" spd="slow" advTm="5000"/>
+    </mc:Fallback>
+  </mc:AlternateContent>
+  <p:timing>
+    <p:tnLst>
+      <p:par>
+        <p:cTn xmlns:p14="http://schemas.microsoft.com/office/powerpoint/2010/main" id="1" dur="indefinite" restart="never" nodeType="tmRoot"/>
+      </p:par>
+    </p:tnLst>
+  </p:timing>
 </p:sld>
 </file>
 

</xml_diff>